<commit_message>
Analysis for rep 5
</commit_message>
<xml_diff>
--- a/bb_soc_exp_networks.pptx
+++ b/bb_soc_exp_networks.pptx
@@ -9,19 +9,20 @@
     <p:sldId id="273" r:id="rId3"/>
     <p:sldId id="272" r:id="rId4"/>
     <p:sldId id="270" r:id="rId5"/>
-    <p:sldId id="275" r:id="rId6"/>
-    <p:sldId id="276" r:id="rId7"/>
-    <p:sldId id="264" r:id="rId8"/>
-    <p:sldId id="261" r:id="rId9"/>
-    <p:sldId id="260" r:id="rId10"/>
-    <p:sldId id="277" r:id="rId11"/>
-    <p:sldId id="269" r:id="rId12"/>
-    <p:sldId id="262" r:id="rId13"/>
-    <p:sldId id="263" r:id="rId14"/>
-    <p:sldId id="266" r:id="rId15"/>
-    <p:sldId id="265" r:id="rId16"/>
-    <p:sldId id="259" r:id="rId17"/>
-    <p:sldId id="258" r:id="rId18"/>
+    <p:sldId id="279" r:id="rId6"/>
+    <p:sldId id="275" r:id="rId7"/>
+    <p:sldId id="276" r:id="rId8"/>
+    <p:sldId id="264" r:id="rId9"/>
+    <p:sldId id="261" r:id="rId10"/>
+    <p:sldId id="260" r:id="rId11"/>
+    <p:sldId id="277" r:id="rId12"/>
+    <p:sldId id="269" r:id="rId13"/>
+    <p:sldId id="262" r:id="rId14"/>
+    <p:sldId id="263" r:id="rId15"/>
+    <p:sldId id="266" r:id="rId16"/>
+    <p:sldId id="265" r:id="rId17"/>
+    <p:sldId id="259" r:id="rId18"/>
+    <p:sldId id="258" r:id="rId19"/>
   </p:sldIdLst>
   <p:sldSz cx="12192000" cy="6858000"/>
   <p:notesSz cx="6858000" cy="9144000"/>
@@ -283,7 +284,7 @@
           <a:p>
             <a:fld id="{CB61FE93-40E5-4B90-8B3A-E7F187B3D00B}" type="datetimeFigureOut">
               <a:rPr lang="en-CA" smtClean="0"/>
-              <a:t>2022-11-01</a:t>
+              <a:t>2022-11-06</a:t>
             </a:fld>
             <a:endParaRPr lang="en-CA"/>
           </a:p>
@@ -483,7 +484,7 @@
           <a:p>
             <a:fld id="{CB61FE93-40E5-4B90-8B3A-E7F187B3D00B}" type="datetimeFigureOut">
               <a:rPr lang="en-CA" smtClean="0"/>
-              <a:t>2022-11-01</a:t>
+              <a:t>2022-11-06</a:t>
             </a:fld>
             <a:endParaRPr lang="en-CA"/>
           </a:p>
@@ -693,7 +694,7 @@
           <a:p>
             <a:fld id="{CB61FE93-40E5-4B90-8B3A-E7F187B3D00B}" type="datetimeFigureOut">
               <a:rPr lang="en-CA" smtClean="0"/>
-              <a:t>2022-11-01</a:t>
+              <a:t>2022-11-06</a:t>
             </a:fld>
             <a:endParaRPr lang="en-CA"/>
           </a:p>
@@ -893,7 +894,7 @@
           <a:p>
             <a:fld id="{CB61FE93-40E5-4B90-8B3A-E7F187B3D00B}" type="datetimeFigureOut">
               <a:rPr lang="en-CA" smtClean="0"/>
-              <a:t>2022-11-01</a:t>
+              <a:t>2022-11-06</a:t>
             </a:fld>
             <a:endParaRPr lang="en-CA"/>
           </a:p>
@@ -1169,7 +1170,7 @@
           <a:p>
             <a:fld id="{CB61FE93-40E5-4B90-8B3A-E7F187B3D00B}" type="datetimeFigureOut">
               <a:rPr lang="en-CA" smtClean="0"/>
-              <a:t>2022-11-01</a:t>
+              <a:t>2022-11-06</a:t>
             </a:fld>
             <a:endParaRPr lang="en-CA"/>
           </a:p>
@@ -1437,7 +1438,7 @@
           <a:p>
             <a:fld id="{CB61FE93-40E5-4B90-8B3A-E7F187B3D00B}" type="datetimeFigureOut">
               <a:rPr lang="en-CA" smtClean="0"/>
-              <a:t>2022-11-01</a:t>
+              <a:t>2022-11-06</a:t>
             </a:fld>
             <a:endParaRPr lang="en-CA"/>
           </a:p>
@@ -1852,7 +1853,7 @@
           <a:p>
             <a:fld id="{CB61FE93-40E5-4B90-8B3A-E7F187B3D00B}" type="datetimeFigureOut">
               <a:rPr lang="en-CA" smtClean="0"/>
-              <a:t>2022-11-01</a:t>
+              <a:t>2022-11-06</a:t>
             </a:fld>
             <a:endParaRPr lang="en-CA"/>
           </a:p>
@@ -1994,7 +1995,7 @@
           <a:p>
             <a:fld id="{CB61FE93-40E5-4B90-8B3A-E7F187B3D00B}" type="datetimeFigureOut">
               <a:rPr lang="en-CA" smtClean="0"/>
-              <a:t>2022-11-01</a:t>
+              <a:t>2022-11-06</a:t>
             </a:fld>
             <a:endParaRPr lang="en-CA"/>
           </a:p>
@@ -2107,7 +2108,7 @@
           <a:p>
             <a:fld id="{CB61FE93-40E5-4B90-8B3A-E7F187B3D00B}" type="datetimeFigureOut">
               <a:rPr lang="en-CA" smtClean="0"/>
-              <a:t>2022-11-01</a:t>
+              <a:t>2022-11-06</a:t>
             </a:fld>
             <a:endParaRPr lang="en-CA"/>
           </a:p>
@@ -2420,7 +2421,7 @@
           <a:p>
             <a:fld id="{CB61FE93-40E5-4B90-8B3A-E7F187B3D00B}" type="datetimeFigureOut">
               <a:rPr lang="en-CA" smtClean="0"/>
-              <a:t>2022-11-01</a:t>
+              <a:t>2022-11-06</a:t>
             </a:fld>
             <a:endParaRPr lang="en-CA"/>
           </a:p>
@@ -2709,7 +2710,7 @@
           <a:p>
             <a:fld id="{CB61FE93-40E5-4B90-8B3A-E7F187B3D00B}" type="datetimeFigureOut">
               <a:rPr lang="en-CA" smtClean="0"/>
-              <a:t>2022-11-01</a:t>
+              <a:t>2022-11-06</a:t>
             </a:fld>
             <a:endParaRPr lang="en-CA"/>
           </a:p>
@@ -2952,7 +2953,7 @@
           <a:p>
             <a:fld id="{CB61FE93-40E5-4B90-8B3A-E7F187B3D00B}" type="datetimeFigureOut">
               <a:rPr lang="en-CA" smtClean="0"/>
-              <a:t>2022-11-01</a:t>
+              <a:t>2022-11-06</a:t>
             </a:fld>
             <a:endParaRPr lang="en-CA"/>
           </a:p>
@@ -3899,10 +3900,10 @@
       </p:grpSpPr>
       <p:sp>
         <p:nvSpPr>
-          <p:cNvPr id="2" name="TextBox 1">
-            <a:extLst>
-              <a:ext uri="{FF2B5EF4-FFF2-40B4-BE49-F238E27FC236}">
-                <a16:creationId xmlns:a16="http://schemas.microsoft.com/office/drawing/2014/main" id="{5FBCA0E6-712E-0FBF-FCC9-EC6D2E85E2DD}"/>
+          <p:cNvPr id="7" name="TextBox 6">
+            <a:extLst>
+              <a:ext uri="{FF2B5EF4-FFF2-40B4-BE49-F238E27FC236}">
+                <a16:creationId xmlns:a16="http://schemas.microsoft.com/office/drawing/2014/main" id="{83D35964-B879-29E0-A265-ACDDA2AE1440}"/>
               </a:ext>
             </a:extLst>
           </p:cNvPr>
@@ -3911,7 +3912,7 @@
         </p:nvSpPr>
         <p:spPr>
           <a:xfrm>
-            <a:off x="242614" y="202614"/>
+            <a:off x="242614" y="191982"/>
             <a:ext cx="11706771" cy="523220"/>
           </a:xfrm>
           <a:prstGeom prst="rect">
@@ -3927,17 +3928,17 @@
           <a:p>
             <a:r>
               <a:rPr lang="en-CA" sz="2800" dirty="0"/>
-              <a:t>Proportion of mounts directed at females that were evaded</a:t>
+              <a:t>Proportion of mounts where females attempted to avoid that were successful</a:t>
             </a:r>
           </a:p>
         </p:txBody>
       </p:sp>
       <p:pic>
         <p:nvPicPr>
-          <p:cNvPr id="4" name="Picture 3">
-            <a:extLst>
-              <a:ext uri="{FF2B5EF4-FFF2-40B4-BE49-F238E27FC236}">
-                <a16:creationId xmlns:a16="http://schemas.microsoft.com/office/drawing/2014/main" id="{41814A7C-A0FA-AB44-9AD6-F80479994A70}"/>
+          <p:cNvPr id="3" name="Picture 2">
+            <a:extLst>
+              <a:ext uri="{FF2B5EF4-FFF2-40B4-BE49-F238E27FC236}">
+                <a16:creationId xmlns:a16="http://schemas.microsoft.com/office/drawing/2014/main" id="{E0DA2BCC-437C-349B-A5D7-5EE3198D5420}"/>
               </a:ext>
             </a:extLst>
           </p:cNvPr>
@@ -3946,15 +3947,16 @@
           </p:cNvPicPr>
           <p:nvPr/>
         </p:nvPicPr>
-        <p:blipFill rotWithShape="1">
+        <p:blipFill>
           <a:blip r:embed="rId2"/>
-          <a:srcRect t="1015"/>
-          <a:stretch/>
+          <a:stretch>
+            <a:fillRect/>
+          </a:stretch>
         </p:blipFill>
         <p:spPr>
           <a:xfrm>
-            <a:off x="2846760" y="927652"/>
-            <a:ext cx="6078578" cy="5460752"/>
+            <a:off x="3395284" y="802896"/>
+            <a:ext cx="5783205" cy="5813804"/>
           </a:xfrm>
           <a:prstGeom prst="rect">
             <a:avLst/>
@@ -3964,7 +3966,7 @@
     </p:spTree>
     <p:extLst>
       <p:ext uri="{BB962C8B-B14F-4D97-AF65-F5344CB8AC3E}">
-        <p14:creationId xmlns:p14="http://schemas.microsoft.com/office/powerpoint/2010/main" val="4071322826"/>
+        <p14:creationId xmlns:p14="http://schemas.microsoft.com/office/powerpoint/2010/main" val="4218799445"/>
       </p:ext>
     </p:extLst>
   </p:cSld>
@@ -3993,10 +3995,10 @@
       </p:grpSpPr>
       <p:sp>
         <p:nvSpPr>
-          <p:cNvPr id="4" name="TextBox 3">
-            <a:extLst>
-              <a:ext uri="{FF2B5EF4-FFF2-40B4-BE49-F238E27FC236}">
-                <a16:creationId xmlns:a16="http://schemas.microsoft.com/office/drawing/2014/main" id="{A15D9475-3FA1-5658-49D0-90EE0465472B}"/>
+          <p:cNvPr id="2" name="TextBox 1">
+            <a:extLst>
+              <a:ext uri="{FF2B5EF4-FFF2-40B4-BE49-F238E27FC236}">
+                <a16:creationId xmlns:a16="http://schemas.microsoft.com/office/drawing/2014/main" id="{5FBCA0E6-712E-0FBF-FCC9-EC6D2E85E2DD}"/>
               </a:ext>
             </a:extLst>
           </p:cNvPr>
@@ -4005,7 +4007,7 @@
         </p:nvSpPr>
         <p:spPr>
           <a:xfrm>
-            <a:off x="242614" y="191982"/>
+            <a:off x="242614" y="202614"/>
             <a:ext cx="11706771" cy="523220"/>
           </a:xfrm>
           <a:prstGeom prst="rect">
@@ -4021,17 +4023,17 @@
           <a:p>
             <a:r>
               <a:rPr lang="en-CA" sz="2800" dirty="0"/>
-              <a:t>Proportion of mounts aborted where males had the choice to abort</a:t>
+              <a:t>Proportion of mounts directed at females that were evaded</a:t>
             </a:r>
           </a:p>
         </p:txBody>
       </p:sp>
       <p:pic>
         <p:nvPicPr>
-          <p:cNvPr id="3" name="Picture 2">
-            <a:extLst>
-              <a:ext uri="{FF2B5EF4-FFF2-40B4-BE49-F238E27FC236}">
-                <a16:creationId xmlns:a16="http://schemas.microsoft.com/office/drawing/2014/main" id="{3D6FA5CC-BD46-FBD3-E84A-71FB160FEEC2}"/>
+          <p:cNvPr id="4" name="Picture 3">
+            <a:extLst>
+              <a:ext uri="{FF2B5EF4-FFF2-40B4-BE49-F238E27FC236}">
+                <a16:creationId xmlns:a16="http://schemas.microsoft.com/office/drawing/2014/main" id="{41814A7C-A0FA-AB44-9AD6-F80479994A70}"/>
               </a:ext>
             </a:extLst>
           </p:cNvPr>
@@ -4040,16 +4042,15 @@
           </p:cNvPicPr>
           <p:nvPr/>
         </p:nvPicPr>
-        <p:blipFill>
+        <p:blipFill rotWithShape="1">
           <a:blip r:embed="rId2"/>
-          <a:stretch>
-            <a:fillRect/>
-          </a:stretch>
+          <a:srcRect t="1015"/>
+          <a:stretch/>
         </p:blipFill>
         <p:spPr>
           <a:xfrm>
-            <a:off x="2753666" y="826696"/>
-            <a:ext cx="6449970" cy="5839322"/>
+            <a:off x="2846760" y="927652"/>
+            <a:ext cx="6078578" cy="5460752"/>
           </a:xfrm>
           <a:prstGeom prst="rect">
             <a:avLst/>
@@ -4059,7 +4060,7 @@
     </p:spTree>
     <p:extLst>
       <p:ext uri="{BB962C8B-B14F-4D97-AF65-F5344CB8AC3E}">
-        <p14:creationId xmlns:p14="http://schemas.microsoft.com/office/powerpoint/2010/main" val="2166282056"/>
+        <p14:creationId xmlns:p14="http://schemas.microsoft.com/office/powerpoint/2010/main" val="4071322826"/>
       </p:ext>
     </p:extLst>
   </p:cSld>
@@ -4091,7 +4092,7 @@
           <p:cNvPr id="4" name="TextBox 3">
             <a:extLst>
               <a:ext uri="{FF2B5EF4-FFF2-40B4-BE49-F238E27FC236}">
-                <a16:creationId xmlns:a16="http://schemas.microsoft.com/office/drawing/2014/main" id="{89528861-0873-5C1D-F48A-A4D17DFEB931}"/>
+                <a16:creationId xmlns:a16="http://schemas.microsoft.com/office/drawing/2014/main" id="{A15D9475-3FA1-5658-49D0-90EE0465472B}"/>
               </a:ext>
             </a:extLst>
           </p:cNvPr>
@@ -4116,7 +4117,7 @@
           <a:p>
             <a:r>
               <a:rPr lang="en-CA" sz="2800" dirty="0"/>
-              <a:t>Proportion of all mounts that resulted in insemination</a:t>
+              <a:t>Proportion of mounts aborted where males had the choice to abort</a:t>
             </a:r>
           </a:p>
         </p:txBody>
@@ -4126,7 +4127,7 @@
           <p:cNvPr id="3" name="Picture 2">
             <a:extLst>
               <a:ext uri="{FF2B5EF4-FFF2-40B4-BE49-F238E27FC236}">
-                <a16:creationId xmlns:a16="http://schemas.microsoft.com/office/drawing/2014/main" id="{BCE11C09-D1FE-E5CE-5CBF-E6214F51FA8B}"/>
+                <a16:creationId xmlns:a16="http://schemas.microsoft.com/office/drawing/2014/main" id="{3D6FA5CC-BD46-FBD3-E84A-71FB160FEEC2}"/>
               </a:ext>
             </a:extLst>
           </p:cNvPr>
@@ -4143,8 +4144,8 @@
         </p:blipFill>
         <p:spPr>
           <a:xfrm>
-            <a:off x="2684743" y="715202"/>
-            <a:ext cx="6576878" cy="5950816"/>
+            <a:off x="2753666" y="826696"/>
+            <a:ext cx="6449970" cy="5839322"/>
           </a:xfrm>
           <a:prstGeom prst="rect">
             <a:avLst/>
@@ -4154,7 +4155,7 @@
     </p:spTree>
     <p:extLst>
       <p:ext uri="{BB962C8B-B14F-4D97-AF65-F5344CB8AC3E}">
-        <p14:creationId xmlns:p14="http://schemas.microsoft.com/office/powerpoint/2010/main" val="3422684493"/>
+        <p14:creationId xmlns:p14="http://schemas.microsoft.com/office/powerpoint/2010/main" val="2166282056"/>
       </p:ext>
     </p:extLst>
   </p:cSld>
@@ -4186,6 +4187,101 @@
           <p:cNvPr id="4" name="TextBox 3">
             <a:extLst>
               <a:ext uri="{FF2B5EF4-FFF2-40B4-BE49-F238E27FC236}">
+                <a16:creationId xmlns:a16="http://schemas.microsoft.com/office/drawing/2014/main" id="{89528861-0873-5C1D-F48A-A4D17DFEB931}"/>
+              </a:ext>
+            </a:extLst>
+          </p:cNvPr>
+          <p:cNvSpPr txBox="1"/>
+          <p:nvPr/>
+        </p:nvSpPr>
+        <p:spPr>
+          <a:xfrm>
+            <a:off x="242614" y="191982"/>
+            <a:ext cx="11706771" cy="523220"/>
+          </a:xfrm>
+          <a:prstGeom prst="rect">
+            <a:avLst/>
+          </a:prstGeom>
+          <a:noFill/>
+        </p:spPr>
+        <p:txBody>
+          <a:bodyPr wrap="square">
+            <a:spAutoFit/>
+          </a:bodyPr>
+          <a:lstStyle/>
+          <a:p>
+            <a:r>
+              <a:rPr lang="en-CA" sz="2800" dirty="0"/>
+              <a:t>Proportion of all mounts that resulted in insemination</a:t>
+            </a:r>
+          </a:p>
+        </p:txBody>
+      </p:sp>
+      <p:pic>
+        <p:nvPicPr>
+          <p:cNvPr id="3" name="Picture 2">
+            <a:extLst>
+              <a:ext uri="{FF2B5EF4-FFF2-40B4-BE49-F238E27FC236}">
+                <a16:creationId xmlns:a16="http://schemas.microsoft.com/office/drawing/2014/main" id="{BCE11C09-D1FE-E5CE-5CBF-E6214F51FA8B}"/>
+              </a:ext>
+            </a:extLst>
+          </p:cNvPr>
+          <p:cNvPicPr>
+            <a:picLocks noChangeAspect="1"/>
+          </p:cNvPicPr>
+          <p:nvPr/>
+        </p:nvPicPr>
+        <p:blipFill>
+          <a:blip r:embed="rId2"/>
+          <a:stretch>
+            <a:fillRect/>
+          </a:stretch>
+        </p:blipFill>
+        <p:spPr>
+          <a:xfrm>
+            <a:off x="2684743" y="715202"/>
+            <a:ext cx="6576878" cy="5950816"/>
+          </a:xfrm>
+          <a:prstGeom prst="rect">
+            <a:avLst/>
+          </a:prstGeom>
+        </p:spPr>
+      </p:pic>
+    </p:spTree>
+    <p:extLst>
+      <p:ext uri="{BB962C8B-B14F-4D97-AF65-F5344CB8AC3E}">
+        <p14:creationId xmlns:p14="http://schemas.microsoft.com/office/powerpoint/2010/main" val="3422684493"/>
+      </p:ext>
+    </p:extLst>
+  </p:cSld>
+  <p:clrMapOvr>
+    <a:masterClrMapping/>
+  </p:clrMapOvr>
+</p:sld>
+</file>
+
+<file path=ppt/slides/slide14.xml><?xml version="1.0" encoding="utf-8"?>
+<p:sld xmlns:a="http://schemas.openxmlformats.org/drawingml/2006/main" xmlns:r="http://schemas.openxmlformats.org/officeDocument/2006/relationships" xmlns:p="http://schemas.openxmlformats.org/presentationml/2006/main">
+  <p:cSld>
+    <p:spTree>
+      <p:nvGrpSpPr>
+        <p:cNvPr id="1" name=""/>
+        <p:cNvGrpSpPr/>
+        <p:nvPr/>
+      </p:nvGrpSpPr>
+      <p:grpSpPr>
+        <a:xfrm>
+          <a:off x="0" y="0"/>
+          <a:ext cx="0" cy="0"/>
+          <a:chOff x="0" y="0"/>
+          <a:chExt cx="0" cy="0"/>
+        </a:xfrm>
+      </p:grpSpPr>
+      <p:sp>
+        <p:nvSpPr>
+          <p:cNvPr id="4" name="TextBox 3">
+            <a:extLst>
+              <a:ext uri="{FF2B5EF4-FFF2-40B4-BE49-F238E27FC236}">
                 <a16:creationId xmlns:a16="http://schemas.microsoft.com/office/drawing/2014/main" id="{720F8BF1-F2AC-921A-D83F-C74C126D9D47}"/>
               </a:ext>
             </a:extLst>
@@ -4259,7 +4355,7 @@
 </p:sld>
 </file>
 
-<file path=ppt/slides/slide14.xml><?xml version="1.0" encoding="utf-8"?>
+<file path=ppt/slides/slide15.xml><?xml version="1.0" encoding="utf-8"?>
 <p:sld xmlns:a="http://schemas.openxmlformats.org/drawingml/2006/main" xmlns:r="http://schemas.openxmlformats.org/officeDocument/2006/relationships" xmlns:p="http://schemas.openxmlformats.org/presentationml/2006/main">
   <p:cSld>
     <p:spTree>
@@ -4742,7 +4838,7 @@
 </p:sld>
 </file>
 
-<file path=ppt/slides/slide15.xml><?xml version="1.0" encoding="utf-8"?>
+<file path=ppt/slides/slide16.xml><?xml version="1.0" encoding="utf-8"?>
 <p:sld xmlns:a="http://schemas.openxmlformats.org/drawingml/2006/main" xmlns:r="http://schemas.openxmlformats.org/officeDocument/2006/relationships" xmlns:p="http://schemas.openxmlformats.org/presentationml/2006/main">
   <p:cSld>
     <p:spTree>
@@ -5225,7 +5321,7 @@
 </p:sld>
 </file>
 
-<file path=ppt/slides/slide16.xml><?xml version="1.0" encoding="utf-8"?>
+<file path=ppt/slides/slide17.xml><?xml version="1.0" encoding="utf-8"?>
 <p:sld xmlns:a="http://schemas.openxmlformats.org/drawingml/2006/main" xmlns:r="http://schemas.openxmlformats.org/officeDocument/2006/relationships" xmlns:p="http://schemas.openxmlformats.org/presentationml/2006/main">
   <p:cSld>
     <p:spTree>
@@ -5708,7 +5804,7 @@
 </p:sld>
 </file>
 
-<file path=ppt/slides/slide17.xml><?xml version="1.0" encoding="utf-8"?>
+<file path=ppt/slides/slide18.xml><?xml version="1.0" encoding="utf-8"?>
 <p:sld xmlns:a="http://schemas.openxmlformats.org/drawingml/2006/main" xmlns:r="http://schemas.openxmlformats.org/officeDocument/2006/relationships" xmlns:p="http://schemas.openxmlformats.org/presentationml/2006/main">
   <p:cSld>
     <p:spTree>
@@ -7792,47 +7888,12 @@
           <a:chExt cx="0" cy="0"/>
         </a:xfrm>
       </p:grpSpPr>
-      <p:sp>
-        <p:nvSpPr>
-          <p:cNvPr id="2" name="TextBox 1">
-            <a:extLst>
-              <a:ext uri="{FF2B5EF4-FFF2-40B4-BE49-F238E27FC236}">
-                <a16:creationId xmlns:a16="http://schemas.microsoft.com/office/drawing/2014/main" id="{C456DF4F-32CA-79AC-854F-B198CDD95AB0}"/>
-              </a:ext>
-            </a:extLst>
-          </p:cNvPr>
-          <p:cNvSpPr txBox="1"/>
-          <p:nvPr/>
-        </p:nvSpPr>
-        <p:spPr>
-          <a:xfrm>
-            <a:off x="242614" y="191982"/>
-            <a:ext cx="11706771" cy="523220"/>
-          </a:xfrm>
-          <a:prstGeom prst="rect">
-            <a:avLst/>
-          </a:prstGeom>
-          <a:noFill/>
-        </p:spPr>
-        <p:txBody>
-          <a:bodyPr wrap="square">
-            <a:spAutoFit/>
-          </a:bodyPr>
-          <a:lstStyle/>
-          <a:p>
-            <a:r>
-              <a:rPr lang="en-CA" sz="2800" dirty="0"/>
-              <a:t>Total mounts performed</a:t>
-            </a:r>
-          </a:p>
-        </p:txBody>
-      </p:sp>
       <p:pic>
         <p:nvPicPr>
-          <p:cNvPr id="10" name="Picture 9">
-            <a:extLst>
-              <a:ext uri="{FF2B5EF4-FFF2-40B4-BE49-F238E27FC236}">
-                <a16:creationId xmlns:a16="http://schemas.microsoft.com/office/drawing/2014/main" id="{B5396E68-D1C2-ECB6-A234-428DF375839F}"/>
+          <p:cNvPr id="13" name="Picture 12">
+            <a:extLst>
+              <a:ext uri="{FF2B5EF4-FFF2-40B4-BE49-F238E27FC236}">
+                <a16:creationId xmlns:a16="http://schemas.microsoft.com/office/drawing/2014/main" id="{D029FEEE-08D8-EDBA-4F63-9F4C5AF8066E}"/>
               </a:ext>
             </a:extLst>
           </p:cNvPr>
@@ -7849,8 +7910,476 @@
         </p:blipFill>
         <p:spPr>
           <a:xfrm>
-            <a:off x="3639764" y="993396"/>
-            <a:ext cx="5344271" cy="5430008"/>
+            <a:off x="5478929" y="704413"/>
+            <a:ext cx="4570818" cy="4607443"/>
+          </a:xfrm>
+          <a:prstGeom prst="rect">
+            <a:avLst/>
+          </a:prstGeom>
+        </p:spPr>
+      </p:pic>
+      <p:grpSp>
+        <p:nvGrpSpPr>
+          <p:cNvPr id="4" name="Group 3">
+            <a:extLst>
+              <a:ext uri="{FF2B5EF4-FFF2-40B4-BE49-F238E27FC236}">
+                <a16:creationId xmlns:a16="http://schemas.microsoft.com/office/drawing/2014/main" id="{EE927B0E-0AE7-CAB1-A8C6-702B9DBD9523}"/>
+              </a:ext>
+            </a:extLst>
+          </p:cNvPr>
+          <p:cNvGrpSpPr/>
+          <p:nvPr/>
+        </p:nvGrpSpPr>
+        <p:grpSpPr>
+          <a:xfrm>
+            <a:off x="9677847" y="129451"/>
+            <a:ext cx="2514153" cy="1399829"/>
+            <a:chOff x="6923562" y="2710726"/>
+            <a:chExt cx="2514153" cy="1399829"/>
+          </a:xfrm>
+        </p:grpSpPr>
+        <p:sp>
+          <p:nvSpPr>
+            <p:cNvPr id="5" name="Oval 4">
+              <a:extLst>
+                <a:ext uri="{FF2B5EF4-FFF2-40B4-BE49-F238E27FC236}">
+                  <a16:creationId xmlns:a16="http://schemas.microsoft.com/office/drawing/2014/main" id="{9C69DA33-009E-E13C-CEE7-A048EDDA38F3}"/>
+                </a:ext>
+              </a:extLst>
+            </p:cNvPr>
+            <p:cNvSpPr/>
+            <p:nvPr/>
+          </p:nvSpPr>
+          <p:spPr>
+            <a:xfrm>
+              <a:off x="6923562" y="2745610"/>
+              <a:ext cx="399011" cy="371302"/>
+            </a:xfrm>
+            <a:prstGeom prst="ellipse">
+              <a:avLst/>
+            </a:prstGeom>
+            <a:solidFill>
+              <a:srgbClr val="BFEFFF"/>
+            </a:solidFill>
+            <a:ln>
+              <a:solidFill>
+                <a:schemeClr val="tx1"/>
+              </a:solidFill>
+            </a:ln>
+          </p:spPr>
+          <p:style>
+            <a:lnRef idx="2">
+              <a:schemeClr val="accent1">
+                <a:shade val="50000"/>
+              </a:schemeClr>
+            </a:lnRef>
+            <a:fillRef idx="1">
+              <a:schemeClr val="accent1"/>
+            </a:fillRef>
+            <a:effectRef idx="0">
+              <a:schemeClr val="accent1"/>
+            </a:effectRef>
+            <a:fontRef idx="minor">
+              <a:schemeClr val="lt1"/>
+            </a:fontRef>
+          </p:style>
+          <p:txBody>
+            <a:bodyPr rtlCol="0" anchor="ctr"/>
+            <a:lstStyle/>
+            <a:p>
+              <a:pPr algn="ctr"/>
+              <a:endParaRPr lang="en-CA"/>
+            </a:p>
+          </p:txBody>
+        </p:sp>
+        <p:sp>
+          <p:nvSpPr>
+            <p:cNvPr id="6" name="Oval 5">
+              <a:extLst>
+                <a:ext uri="{FF2B5EF4-FFF2-40B4-BE49-F238E27FC236}">
+                  <a16:creationId xmlns:a16="http://schemas.microsoft.com/office/drawing/2014/main" id="{66818D10-5A9A-E170-132C-FB324465B5DD}"/>
+                </a:ext>
+              </a:extLst>
+            </p:cNvPr>
+            <p:cNvSpPr/>
+            <p:nvPr/>
+          </p:nvSpPr>
+          <p:spPr>
+            <a:xfrm>
+              <a:off x="6923562" y="3243349"/>
+              <a:ext cx="399011" cy="371302"/>
+            </a:xfrm>
+            <a:prstGeom prst="ellipse">
+              <a:avLst/>
+            </a:prstGeom>
+            <a:solidFill>
+              <a:srgbClr val="00688B"/>
+            </a:solidFill>
+            <a:ln>
+              <a:solidFill>
+                <a:schemeClr val="tx1"/>
+              </a:solidFill>
+            </a:ln>
+          </p:spPr>
+          <p:style>
+            <a:lnRef idx="2">
+              <a:schemeClr val="accent1">
+                <a:shade val="50000"/>
+              </a:schemeClr>
+            </a:lnRef>
+            <a:fillRef idx="1">
+              <a:schemeClr val="accent1"/>
+            </a:fillRef>
+            <a:effectRef idx="0">
+              <a:schemeClr val="accent1"/>
+            </a:effectRef>
+            <a:fontRef idx="minor">
+              <a:schemeClr val="lt1"/>
+            </a:fontRef>
+          </p:style>
+          <p:txBody>
+            <a:bodyPr rtlCol="0" anchor="ctr"/>
+            <a:lstStyle/>
+            <a:p>
+              <a:pPr algn="ctr"/>
+              <a:endParaRPr lang="en-CA"/>
+            </a:p>
+          </p:txBody>
+        </p:sp>
+        <p:sp>
+          <p:nvSpPr>
+            <p:cNvPr id="7" name="Oval 6">
+              <a:extLst>
+                <a:ext uri="{FF2B5EF4-FFF2-40B4-BE49-F238E27FC236}">
+                  <a16:creationId xmlns:a16="http://schemas.microsoft.com/office/drawing/2014/main" id="{D31C986E-8417-2EBA-AAA6-AFA7F0EB1999}"/>
+                </a:ext>
+              </a:extLst>
+            </p:cNvPr>
+            <p:cNvSpPr/>
+            <p:nvPr/>
+          </p:nvSpPr>
+          <p:spPr>
+            <a:xfrm>
+              <a:off x="6923563" y="3738688"/>
+              <a:ext cx="399011" cy="371302"/>
+            </a:xfrm>
+            <a:prstGeom prst="ellipse">
+              <a:avLst/>
+            </a:prstGeom>
+            <a:solidFill>
+              <a:srgbClr val="F4A460"/>
+            </a:solidFill>
+            <a:ln>
+              <a:solidFill>
+                <a:schemeClr val="tx1"/>
+              </a:solidFill>
+            </a:ln>
+          </p:spPr>
+          <p:style>
+            <a:lnRef idx="2">
+              <a:schemeClr val="accent1">
+                <a:shade val="50000"/>
+              </a:schemeClr>
+            </a:lnRef>
+            <a:fillRef idx="1">
+              <a:schemeClr val="accent1"/>
+            </a:fillRef>
+            <a:effectRef idx="0">
+              <a:schemeClr val="accent1"/>
+            </a:effectRef>
+            <a:fontRef idx="minor">
+              <a:schemeClr val="lt1"/>
+            </a:fontRef>
+          </p:style>
+          <p:txBody>
+            <a:bodyPr rtlCol="0" anchor="ctr"/>
+            <a:lstStyle/>
+            <a:p>
+              <a:pPr algn="ctr"/>
+              <a:endParaRPr lang="en-CA"/>
+            </a:p>
+          </p:txBody>
+        </p:sp>
+        <p:sp>
+          <p:nvSpPr>
+            <p:cNvPr id="8" name="TextBox 7">
+              <a:extLst>
+                <a:ext uri="{FF2B5EF4-FFF2-40B4-BE49-F238E27FC236}">
+                  <a16:creationId xmlns:a16="http://schemas.microsoft.com/office/drawing/2014/main" id="{3E167354-EFEA-3135-DCA2-7F95F1C2D824}"/>
+                </a:ext>
+              </a:extLst>
+            </p:cNvPr>
+            <p:cNvSpPr txBox="1"/>
+            <p:nvPr/>
+          </p:nvSpPr>
+          <p:spPr>
+            <a:xfrm>
+              <a:off x="7322573" y="2710726"/>
+              <a:ext cx="1690926" cy="406186"/>
+            </a:xfrm>
+            <a:prstGeom prst="rect">
+              <a:avLst/>
+            </a:prstGeom>
+            <a:noFill/>
+          </p:spPr>
+          <p:txBody>
+            <a:bodyPr wrap="square" rtlCol="0">
+              <a:spAutoFit/>
+            </a:bodyPr>
+            <a:lstStyle/>
+            <a:p>
+              <a:r>
+                <a:rPr lang="en-CA" sz="2000" dirty="0"/>
+                <a:t>Isolated male</a:t>
+              </a:r>
+            </a:p>
+          </p:txBody>
+        </p:sp>
+        <p:sp>
+          <p:nvSpPr>
+            <p:cNvPr id="9" name="TextBox 8">
+              <a:extLst>
+                <a:ext uri="{FF2B5EF4-FFF2-40B4-BE49-F238E27FC236}">
+                  <a16:creationId xmlns:a16="http://schemas.microsoft.com/office/drawing/2014/main" id="{CF31FEB9-1B54-2CCD-91C8-E59544101825}"/>
+                </a:ext>
+              </a:extLst>
+            </p:cNvPr>
+            <p:cNvSpPr txBox="1"/>
+            <p:nvPr/>
+          </p:nvSpPr>
+          <p:spPr>
+            <a:xfrm>
+              <a:off x="7322572" y="3204309"/>
+              <a:ext cx="2115143" cy="400110"/>
+            </a:xfrm>
+            <a:prstGeom prst="rect">
+              <a:avLst/>
+            </a:prstGeom>
+            <a:noFill/>
+          </p:spPr>
+          <p:txBody>
+            <a:bodyPr wrap="square" rtlCol="0">
+              <a:spAutoFit/>
+            </a:bodyPr>
+            <a:lstStyle/>
+            <a:p>
+              <a:r>
+                <a:rPr lang="en-CA" sz="2000" dirty="0"/>
+                <a:t>Experienced male</a:t>
+              </a:r>
+            </a:p>
+          </p:txBody>
+        </p:sp>
+        <p:sp>
+          <p:nvSpPr>
+            <p:cNvPr id="10" name="TextBox 9">
+              <a:extLst>
+                <a:ext uri="{FF2B5EF4-FFF2-40B4-BE49-F238E27FC236}">
+                  <a16:creationId xmlns:a16="http://schemas.microsoft.com/office/drawing/2014/main" id="{2288A3F6-40D0-0B85-5211-15B10B5314E9}"/>
+                </a:ext>
+              </a:extLst>
+            </p:cNvPr>
+            <p:cNvSpPr txBox="1"/>
+            <p:nvPr/>
+          </p:nvSpPr>
+          <p:spPr>
+            <a:xfrm>
+              <a:off x="7322572" y="3710445"/>
+              <a:ext cx="2115143" cy="400110"/>
+            </a:xfrm>
+            <a:prstGeom prst="rect">
+              <a:avLst/>
+            </a:prstGeom>
+            <a:noFill/>
+          </p:spPr>
+          <p:txBody>
+            <a:bodyPr wrap="square" rtlCol="0">
+              <a:spAutoFit/>
+            </a:bodyPr>
+            <a:lstStyle/>
+            <a:p>
+              <a:r>
+                <a:rPr lang="en-CA" sz="2000" dirty="0"/>
+                <a:t>Female</a:t>
+              </a:r>
+            </a:p>
+          </p:txBody>
+        </p:sp>
+      </p:grpSp>
+      <p:sp>
+        <p:nvSpPr>
+          <p:cNvPr id="11" name="TextBox 10">
+            <a:extLst>
+              <a:ext uri="{FF2B5EF4-FFF2-40B4-BE49-F238E27FC236}">
+                <a16:creationId xmlns:a16="http://schemas.microsoft.com/office/drawing/2014/main" id="{285AF44C-119B-2ED6-E94D-27036B7A293A}"/>
+              </a:ext>
+            </a:extLst>
+          </p:cNvPr>
+          <p:cNvSpPr txBox="1"/>
+          <p:nvPr/>
+        </p:nvSpPr>
+        <p:spPr>
+          <a:xfrm>
+            <a:off x="176712" y="199998"/>
+            <a:ext cx="7012858" cy="523220"/>
+          </a:xfrm>
+          <a:prstGeom prst="rect">
+            <a:avLst/>
+          </a:prstGeom>
+          <a:noFill/>
+        </p:spPr>
+        <p:txBody>
+          <a:bodyPr wrap="square" rtlCol="0">
+            <a:spAutoFit/>
+          </a:bodyPr>
+          <a:lstStyle/>
+          <a:p>
+            <a:r>
+              <a:rPr lang="en-CA" sz="2800" dirty="0"/>
+              <a:t>Replicate 5 networks (all days)</a:t>
+            </a:r>
+          </a:p>
+        </p:txBody>
+      </p:sp>
+      <p:sp>
+        <p:nvSpPr>
+          <p:cNvPr id="12" name="TextBox 11">
+            <a:extLst>
+              <a:ext uri="{FF2B5EF4-FFF2-40B4-BE49-F238E27FC236}">
+                <a16:creationId xmlns:a16="http://schemas.microsoft.com/office/drawing/2014/main" id="{DBB43D55-F2CE-212D-3A8E-39EEBE37CA31}"/>
+              </a:ext>
+            </a:extLst>
+          </p:cNvPr>
+          <p:cNvSpPr txBox="1"/>
+          <p:nvPr/>
+        </p:nvSpPr>
+        <p:spPr>
+          <a:xfrm>
+            <a:off x="728502" y="5499468"/>
+            <a:ext cx="3953657" cy="1077218"/>
+          </a:xfrm>
+          <a:prstGeom prst="rect">
+            <a:avLst/>
+          </a:prstGeom>
+          <a:noFill/>
+        </p:spPr>
+        <p:txBody>
+          <a:bodyPr wrap="square" rtlCol="0">
+            <a:spAutoFit/>
+          </a:bodyPr>
+          <a:lstStyle/>
+          <a:p>
+            <a:r>
+              <a:rPr lang="en-CA" sz="2400" dirty="0"/>
+              <a:t>Directed </a:t>
+            </a:r>
+            <a:r>
+              <a:rPr lang="en-CA" sz="2400" b="1" dirty="0"/>
+              <a:t>mount</a:t>
+            </a:r>
+            <a:r>
+              <a:rPr lang="en-CA" sz="2400" dirty="0"/>
+              <a:t> network </a:t>
+            </a:r>
+            <a:br>
+              <a:rPr lang="en-CA" sz="2400" dirty="0"/>
+            </a:br>
+            <a:r>
+              <a:rPr lang="en-CA" sz="2000" dirty="0"/>
+              <a:t>Node size: Out-strength for males; </a:t>
+            </a:r>
+          </a:p>
+          <a:p>
+            <a:r>
+              <a:rPr lang="en-CA" sz="2000" dirty="0"/>
+              <a:t>                    Constant for females</a:t>
+            </a:r>
+            <a:endParaRPr lang="en-CA" sz="2400" dirty="0"/>
+          </a:p>
+        </p:txBody>
+      </p:sp>
+      <p:sp>
+        <p:nvSpPr>
+          <p:cNvPr id="15" name="TextBox 14">
+            <a:extLst>
+              <a:ext uri="{FF2B5EF4-FFF2-40B4-BE49-F238E27FC236}">
+                <a16:creationId xmlns:a16="http://schemas.microsoft.com/office/drawing/2014/main" id="{BDF52028-0B95-23CE-6A64-A2FFE254F4FD}"/>
+              </a:ext>
+            </a:extLst>
+          </p:cNvPr>
+          <p:cNvSpPr txBox="1"/>
+          <p:nvPr/>
+        </p:nvSpPr>
+        <p:spPr>
+          <a:xfrm>
+            <a:off x="5481493" y="5480632"/>
+            <a:ext cx="6434282" cy="1077218"/>
+          </a:xfrm>
+          <a:prstGeom prst="rect">
+            <a:avLst/>
+          </a:prstGeom>
+          <a:noFill/>
+        </p:spPr>
+        <p:txBody>
+          <a:bodyPr wrap="square" rtlCol="0">
+            <a:spAutoFit/>
+          </a:bodyPr>
+          <a:lstStyle/>
+          <a:p>
+            <a:r>
+              <a:rPr lang="en-CA" sz="2400" dirty="0"/>
+              <a:t>Directed </a:t>
+            </a:r>
+            <a:r>
+              <a:rPr lang="en-CA" sz="2400" b="1" dirty="0"/>
+              <a:t>insemination</a:t>
+            </a:r>
+            <a:r>
+              <a:rPr lang="en-CA" sz="2400" dirty="0"/>
+              <a:t> network </a:t>
+            </a:r>
+            <a:br>
+              <a:rPr lang="en-CA" sz="2400" dirty="0"/>
+            </a:br>
+            <a:r>
+              <a:rPr lang="en-CA" sz="2000" dirty="0"/>
+              <a:t>Node size: Out-strength for males;</a:t>
+            </a:r>
+            <a:br>
+              <a:rPr lang="en-CA" sz="2000" dirty="0"/>
+            </a:br>
+            <a:r>
+              <a:rPr lang="en-CA" sz="2000" dirty="0"/>
+              <a:t>	    In-strength for females</a:t>
+            </a:r>
+            <a:endParaRPr lang="en-CA" sz="2400" dirty="0"/>
+          </a:p>
+        </p:txBody>
+      </p:sp>
+      <p:pic>
+        <p:nvPicPr>
+          <p:cNvPr id="17" name="Picture 16">
+            <a:extLst>
+              <a:ext uri="{FF2B5EF4-FFF2-40B4-BE49-F238E27FC236}">
+                <a16:creationId xmlns:a16="http://schemas.microsoft.com/office/drawing/2014/main" id="{6C9628C6-FFB6-A781-F502-01AFBE7FFBAD}"/>
+              </a:ext>
+            </a:extLst>
+          </p:cNvPr>
+          <p:cNvPicPr>
+            <a:picLocks noChangeAspect="1"/>
+          </p:cNvPicPr>
+          <p:nvPr/>
+        </p:nvPicPr>
+        <p:blipFill>
+          <a:blip r:embed="rId3"/>
+          <a:stretch>
+            <a:fillRect/>
+          </a:stretch>
+        </p:blipFill>
+        <p:spPr>
+          <a:xfrm>
+            <a:off x="176711" y="623034"/>
+            <a:ext cx="4973257" cy="4949037"/>
           </a:xfrm>
           <a:prstGeom prst="rect">
             <a:avLst/>
@@ -7860,7 +8389,7 @@
     </p:spTree>
     <p:extLst>
       <p:ext uri="{BB962C8B-B14F-4D97-AF65-F5344CB8AC3E}">
-        <p14:creationId xmlns:p14="http://schemas.microsoft.com/office/powerpoint/2010/main" val="3241141293"/>
+        <p14:creationId xmlns:p14="http://schemas.microsoft.com/office/powerpoint/2010/main" val="86304646"/>
       </p:ext>
     </p:extLst>
   </p:cSld>
@@ -7892,7 +8421,7 @@
           <p:cNvPr id="2" name="TextBox 1">
             <a:extLst>
               <a:ext uri="{FF2B5EF4-FFF2-40B4-BE49-F238E27FC236}">
-                <a16:creationId xmlns:a16="http://schemas.microsoft.com/office/drawing/2014/main" id="{501EB813-4FAA-31E0-AFB8-D207072C2FB5}"/>
+                <a16:creationId xmlns:a16="http://schemas.microsoft.com/office/drawing/2014/main" id="{C456DF4F-32CA-79AC-854F-B198CDD95AB0}"/>
               </a:ext>
             </a:extLst>
           </p:cNvPr>
@@ -7917,17 +8446,17 @@
           <a:p>
             <a:r>
               <a:rPr lang="en-CA" sz="2800" dirty="0"/>
-              <a:t>Total inseminations</a:t>
+              <a:t>Total mounts performed</a:t>
             </a:r>
           </a:p>
         </p:txBody>
       </p:sp>
       <p:pic>
         <p:nvPicPr>
-          <p:cNvPr id="4" name="Picture 3">
-            <a:extLst>
-              <a:ext uri="{FF2B5EF4-FFF2-40B4-BE49-F238E27FC236}">
-                <a16:creationId xmlns:a16="http://schemas.microsoft.com/office/drawing/2014/main" id="{F9C0C7CC-C86C-DCFD-26BB-15EC30AA5BC5}"/>
+          <p:cNvPr id="10" name="Picture 9">
+            <a:extLst>
+              <a:ext uri="{FF2B5EF4-FFF2-40B4-BE49-F238E27FC236}">
+                <a16:creationId xmlns:a16="http://schemas.microsoft.com/office/drawing/2014/main" id="{B5396E68-D1C2-ECB6-A234-428DF375839F}"/>
               </a:ext>
             </a:extLst>
           </p:cNvPr>
@@ -7944,8 +8473,8 @@
         </p:blipFill>
         <p:spPr>
           <a:xfrm>
-            <a:off x="3161928" y="988635"/>
-            <a:ext cx="5334744" cy="5401429"/>
+            <a:off x="3639764" y="993396"/>
+            <a:ext cx="5344271" cy="5430008"/>
           </a:xfrm>
           <a:prstGeom prst="rect">
             <a:avLst/>
@@ -7955,7 +8484,7 @@
     </p:spTree>
     <p:extLst>
       <p:ext uri="{BB962C8B-B14F-4D97-AF65-F5344CB8AC3E}">
-        <p14:creationId xmlns:p14="http://schemas.microsoft.com/office/powerpoint/2010/main" val="377255432"/>
+        <p14:creationId xmlns:p14="http://schemas.microsoft.com/office/powerpoint/2010/main" val="3241141293"/>
       </p:ext>
     </p:extLst>
   </p:cSld>
@@ -7984,10 +8513,10 @@
       </p:grpSpPr>
       <p:sp>
         <p:nvSpPr>
-          <p:cNvPr id="4" name="TextBox 3">
-            <a:extLst>
-              <a:ext uri="{FF2B5EF4-FFF2-40B4-BE49-F238E27FC236}">
-                <a16:creationId xmlns:a16="http://schemas.microsoft.com/office/drawing/2014/main" id="{69EC9791-5CBB-2C5A-5052-FE5E376DA986}"/>
+          <p:cNvPr id="2" name="TextBox 1">
+            <a:extLst>
+              <a:ext uri="{FF2B5EF4-FFF2-40B4-BE49-F238E27FC236}">
+                <a16:creationId xmlns:a16="http://schemas.microsoft.com/office/drawing/2014/main" id="{501EB813-4FAA-31E0-AFB8-D207072C2FB5}"/>
               </a:ext>
             </a:extLst>
           </p:cNvPr>
@@ -8012,17 +8541,17 @@
           <a:p>
             <a:r>
               <a:rPr lang="en-CA" sz="2800" dirty="0"/>
-              <a:t>Proportion of mounts directed at other males</a:t>
+              <a:t>Total inseminations</a:t>
             </a:r>
           </a:p>
         </p:txBody>
       </p:sp>
       <p:pic>
         <p:nvPicPr>
-          <p:cNvPr id="5" name="Picture 4">
-            <a:extLst>
-              <a:ext uri="{FF2B5EF4-FFF2-40B4-BE49-F238E27FC236}">
-                <a16:creationId xmlns:a16="http://schemas.microsoft.com/office/drawing/2014/main" id="{C4649B12-ACB5-AEB6-28D5-A573725D98C1}"/>
+          <p:cNvPr id="4" name="Picture 3">
+            <a:extLst>
+              <a:ext uri="{FF2B5EF4-FFF2-40B4-BE49-F238E27FC236}">
+                <a16:creationId xmlns:a16="http://schemas.microsoft.com/office/drawing/2014/main" id="{F9C0C7CC-C86C-DCFD-26BB-15EC30AA5BC5}"/>
               </a:ext>
             </a:extLst>
           </p:cNvPr>
@@ -8039,8 +8568,8 @@
         </p:blipFill>
         <p:spPr>
           <a:xfrm>
-            <a:off x="3104774" y="761487"/>
-            <a:ext cx="5791575" cy="5904531"/>
+            <a:off x="3161928" y="988635"/>
+            <a:ext cx="5334744" cy="5401429"/>
           </a:xfrm>
           <a:prstGeom prst="rect">
             <a:avLst/>
@@ -8050,7 +8579,7 @@
     </p:spTree>
     <p:extLst>
       <p:ext uri="{BB962C8B-B14F-4D97-AF65-F5344CB8AC3E}">
-        <p14:creationId xmlns:p14="http://schemas.microsoft.com/office/powerpoint/2010/main" val="897322973"/>
+        <p14:creationId xmlns:p14="http://schemas.microsoft.com/office/powerpoint/2010/main" val="377255432"/>
       </p:ext>
     </p:extLst>
   </p:cSld>
@@ -8082,7 +8611,7 @@
           <p:cNvPr id="4" name="TextBox 3">
             <a:extLst>
               <a:ext uri="{FF2B5EF4-FFF2-40B4-BE49-F238E27FC236}">
-                <a16:creationId xmlns:a16="http://schemas.microsoft.com/office/drawing/2014/main" id="{0D8F948C-4C16-4068-32E9-BE7B50FA453E}"/>
+                <a16:creationId xmlns:a16="http://schemas.microsoft.com/office/drawing/2014/main" id="{69EC9791-5CBB-2C5A-5052-FE5E376DA986}"/>
               </a:ext>
             </a:extLst>
           </p:cNvPr>
@@ -8107,7 +8636,7 @@
           <a:p>
             <a:r>
               <a:rPr lang="en-CA" sz="2800" dirty="0"/>
-              <a:t>Proportion of mounts directed at females where females tried to evade</a:t>
+              <a:t>Proportion of mounts directed at other males</a:t>
             </a:r>
           </a:p>
         </p:txBody>
@@ -8117,7 +8646,7 @@
           <p:cNvPr id="5" name="Picture 4">
             <a:extLst>
               <a:ext uri="{FF2B5EF4-FFF2-40B4-BE49-F238E27FC236}">
-                <a16:creationId xmlns:a16="http://schemas.microsoft.com/office/drawing/2014/main" id="{E8633DFC-7A7B-A8E2-9082-A54B40A82820}"/>
+                <a16:creationId xmlns:a16="http://schemas.microsoft.com/office/drawing/2014/main" id="{C4649B12-ACB5-AEB6-28D5-A573725D98C1}"/>
               </a:ext>
             </a:extLst>
           </p:cNvPr>
@@ -8134,8 +8663,8 @@
         </p:blipFill>
         <p:spPr>
           <a:xfrm>
-            <a:off x="3376232" y="936243"/>
-            <a:ext cx="5767768" cy="5798072"/>
+            <a:off x="3104774" y="761487"/>
+            <a:ext cx="5791575" cy="5904531"/>
           </a:xfrm>
           <a:prstGeom prst="rect">
             <a:avLst/>
@@ -8145,7 +8674,7 @@
     </p:spTree>
     <p:extLst>
       <p:ext uri="{BB962C8B-B14F-4D97-AF65-F5344CB8AC3E}">
-        <p14:creationId xmlns:p14="http://schemas.microsoft.com/office/powerpoint/2010/main" val="774785539"/>
+        <p14:creationId xmlns:p14="http://schemas.microsoft.com/office/powerpoint/2010/main" val="897322973"/>
       </p:ext>
     </p:extLst>
   </p:cSld>
@@ -8174,10 +8703,10 @@
       </p:grpSpPr>
       <p:sp>
         <p:nvSpPr>
-          <p:cNvPr id="7" name="TextBox 6">
-            <a:extLst>
-              <a:ext uri="{FF2B5EF4-FFF2-40B4-BE49-F238E27FC236}">
-                <a16:creationId xmlns:a16="http://schemas.microsoft.com/office/drawing/2014/main" id="{83D35964-B879-29E0-A265-ACDDA2AE1440}"/>
+          <p:cNvPr id="4" name="TextBox 3">
+            <a:extLst>
+              <a:ext uri="{FF2B5EF4-FFF2-40B4-BE49-F238E27FC236}">
+                <a16:creationId xmlns:a16="http://schemas.microsoft.com/office/drawing/2014/main" id="{0D8F948C-4C16-4068-32E9-BE7B50FA453E}"/>
               </a:ext>
             </a:extLst>
           </p:cNvPr>
@@ -8202,17 +8731,17 @@
           <a:p>
             <a:r>
               <a:rPr lang="en-CA" sz="2800" dirty="0"/>
-              <a:t>Proportion of mounts where females attempted to avoid that were successful</a:t>
+              <a:t>Proportion of mounts directed at females where females tried to evade</a:t>
             </a:r>
           </a:p>
         </p:txBody>
       </p:sp>
       <p:pic>
         <p:nvPicPr>
-          <p:cNvPr id="3" name="Picture 2">
-            <a:extLst>
-              <a:ext uri="{FF2B5EF4-FFF2-40B4-BE49-F238E27FC236}">
-                <a16:creationId xmlns:a16="http://schemas.microsoft.com/office/drawing/2014/main" id="{E0DA2BCC-437C-349B-A5D7-5EE3198D5420}"/>
+          <p:cNvPr id="5" name="Picture 4">
+            <a:extLst>
+              <a:ext uri="{FF2B5EF4-FFF2-40B4-BE49-F238E27FC236}">
+                <a16:creationId xmlns:a16="http://schemas.microsoft.com/office/drawing/2014/main" id="{E8633DFC-7A7B-A8E2-9082-A54B40A82820}"/>
               </a:ext>
             </a:extLst>
           </p:cNvPr>
@@ -8229,8 +8758,8 @@
         </p:blipFill>
         <p:spPr>
           <a:xfrm>
-            <a:off x="3395284" y="802896"/>
-            <a:ext cx="5783205" cy="5813804"/>
+            <a:off x="3376232" y="936243"/>
+            <a:ext cx="5767768" cy="5798072"/>
           </a:xfrm>
           <a:prstGeom prst="rect">
             <a:avLst/>
@@ -8240,7 +8769,7 @@
     </p:spTree>
     <p:extLst>
       <p:ext uri="{BB962C8B-B14F-4D97-AF65-F5344CB8AC3E}">
-        <p14:creationId xmlns:p14="http://schemas.microsoft.com/office/powerpoint/2010/main" val="4218799445"/>
+        <p14:creationId xmlns:p14="http://schemas.microsoft.com/office/powerpoint/2010/main" val="774785539"/>
       </p:ext>
     </p:extLst>
   </p:cSld>

</xml_diff>

<commit_message>
Update networks for rep 6
</commit_message>
<xml_diff>
--- a/bb_soc_exp_networks.pptx
+++ b/bb_soc_exp_networks.pptx
@@ -284,7 +284,7 @@
           <a:p>
             <a:fld id="{CB61FE93-40E5-4B90-8B3A-E7F187B3D00B}" type="datetimeFigureOut">
               <a:rPr lang="en-CA" smtClean="0"/>
-              <a:t>2022-11-06</a:t>
+              <a:t>2022-11-10</a:t>
             </a:fld>
             <a:endParaRPr lang="en-CA"/>
           </a:p>
@@ -484,7 +484,7 @@
           <a:p>
             <a:fld id="{CB61FE93-40E5-4B90-8B3A-E7F187B3D00B}" type="datetimeFigureOut">
               <a:rPr lang="en-CA" smtClean="0"/>
-              <a:t>2022-11-06</a:t>
+              <a:t>2022-11-10</a:t>
             </a:fld>
             <a:endParaRPr lang="en-CA"/>
           </a:p>
@@ -694,7 +694,7 @@
           <a:p>
             <a:fld id="{CB61FE93-40E5-4B90-8B3A-E7F187B3D00B}" type="datetimeFigureOut">
               <a:rPr lang="en-CA" smtClean="0"/>
-              <a:t>2022-11-06</a:t>
+              <a:t>2022-11-10</a:t>
             </a:fld>
             <a:endParaRPr lang="en-CA"/>
           </a:p>
@@ -894,7 +894,7 @@
           <a:p>
             <a:fld id="{CB61FE93-40E5-4B90-8B3A-E7F187B3D00B}" type="datetimeFigureOut">
               <a:rPr lang="en-CA" smtClean="0"/>
-              <a:t>2022-11-06</a:t>
+              <a:t>2022-11-10</a:t>
             </a:fld>
             <a:endParaRPr lang="en-CA"/>
           </a:p>
@@ -1170,7 +1170,7 @@
           <a:p>
             <a:fld id="{CB61FE93-40E5-4B90-8B3A-E7F187B3D00B}" type="datetimeFigureOut">
               <a:rPr lang="en-CA" smtClean="0"/>
-              <a:t>2022-11-06</a:t>
+              <a:t>2022-11-10</a:t>
             </a:fld>
             <a:endParaRPr lang="en-CA"/>
           </a:p>
@@ -1438,7 +1438,7 @@
           <a:p>
             <a:fld id="{CB61FE93-40E5-4B90-8B3A-E7F187B3D00B}" type="datetimeFigureOut">
               <a:rPr lang="en-CA" smtClean="0"/>
-              <a:t>2022-11-06</a:t>
+              <a:t>2022-11-10</a:t>
             </a:fld>
             <a:endParaRPr lang="en-CA"/>
           </a:p>
@@ -1853,7 +1853,7 @@
           <a:p>
             <a:fld id="{CB61FE93-40E5-4B90-8B3A-E7F187B3D00B}" type="datetimeFigureOut">
               <a:rPr lang="en-CA" smtClean="0"/>
-              <a:t>2022-11-06</a:t>
+              <a:t>2022-11-10</a:t>
             </a:fld>
             <a:endParaRPr lang="en-CA"/>
           </a:p>
@@ -1995,7 +1995,7 @@
           <a:p>
             <a:fld id="{CB61FE93-40E5-4B90-8B3A-E7F187B3D00B}" type="datetimeFigureOut">
               <a:rPr lang="en-CA" smtClean="0"/>
-              <a:t>2022-11-06</a:t>
+              <a:t>2022-11-10</a:t>
             </a:fld>
             <a:endParaRPr lang="en-CA"/>
           </a:p>
@@ -2108,7 +2108,7 @@
           <a:p>
             <a:fld id="{CB61FE93-40E5-4B90-8B3A-E7F187B3D00B}" type="datetimeFigureOut">
               <a:rPr lang="en-CA" smtClean="0"/>
-              <a:t>2022-11-06</a:t>
+              <a:t>2022-11-10</a:t>
             </a:fld>
             <a:endParaRPr lang="en-CA"/>
           </a:p>
@@ -2421,7 +2421,7 @@
           <a:p>
             <a:fld id="{CB61FE93-40E5-4B90-8B3A-E7F187B3D00B}" type="datetimeFigureOut">
               <a:rPr lang="en-CA" smtClean="0"/>
-              <a:t>2022-11-06</a:t>
+              <a:t>2022-11-10</a:t>
             </a:fld>
             <a:endParaRPr lang="en-CA"/>
           </a:p>
@@ -2710,7 +2710,7 @@
           <a:p>
             <a:fld id="{CB61FE93-40E5-4B90-8B3A-E7F187B3D00B}" type="datetimeFigureOut">
               <a:rPr lang="en-CA" smtClean="0"/>
-              <a:t>2022-11-06</a:t>
+              <a:t>2022-11-10</a:t>
             </a:fld>
             <a:endParaRPr lang="en-CA"/>
           </a:p>
@@ -2953,7 +2953,7 @@
           <a:p>
             <a:fld id="{CB61FE93-40E5-4B90-8B3A-E7F187B3D00B}" type="datetimeFigureOut">
               <a:rPr lang="en-CA" smtClean="0"/>
-              <a:t>2022-11-06</a:t>
+              <a:t>2022-11-10</a:t>
             </a:fld>
             <a:endParaRPr lang="en-CA"/>
           </a:p>
@@ -3795,7 +3795,7 @@
         <p:spPr>
           <a:xfrm>
             <a:off x="5481493" y="5480632"/>
-            <a:ext cx="6434282" cy="1077218"/>
+            <a:ext cx="4420501" cy="1077218"/>
           </a:xfrm>
           <a:prstGeom prst="rect">
             <a:avLst/>

</xml_diff>

<commit_message>
ppt networks rep 6
</commit_message>
<xml_diff>
--- a/bb_soc_exp_networks.pptx
+++ b/bb_soc_exp_networks.pptx
@@ -10,19 +10,20 @@
     <p:sldId id="272" r:id="rId4"/>
     <p:sldId id="270" r:id="rId5"/>
     <p:sldId id="279" r:id="rId6"/>
-    <p:sldId id="275" r:id="rId7"/>
-    <p:sldId id="276" r:id="rId8"/>
-    <p:sldId id="264" r:id="rId9"/>
-    <p:sldId id="261" r:id="rId10"/>
-    <p:sldId id="260" r:id="rId11"/>
-    <p:sldId id="277" r:id="rId12"/>
-    <p:sldId id="269" r:id="rId13"/>
-    <p:sldId id="262" r:id="rId14"/>
-    <p:sldId id="263" r:id="rId15"/>
-    <p:sldId id="266" r:id="rId16"/>
-    <p:sldId id="265" r:id="rId17"/>
-    <p:sldId id="259" r:id="rId18"/>
-    <p:sldId id="258" r:id="rId19"/>
+    <p:sldId id="281" r:id="rId7"/>
+    <p:sldId id="275" r:id="rId8"/>
+    <p:sldId id="276" r:id="rId9"/>
+    <p:sldId id="264" r:id="rId10"/>
+    <p:sldId id="261" r:id="rId11"/>
+    <p:sldId id="260" r:id="rId12"/>
+    <p:sldId id="277" r:id="rId13"/>
+    <p:sldId id="269" r:id="rId14"/>
+    <p:sldId id="262" r:id="rId15"/>
+    <p:sldId id="263" r:id="rId16"/>
+    <p:sldId id="266" r:id="rId17"/>
+    <p:sldId id="265" r:id="rId18"/>
+    <p:sldId id="259" r:id="rId19"/>
+    <p:sldId id="258" r:id="rId20"/>
   </p:sldIdLst>
   <p:sldSz cx="12192000" cy="6858000"/>
   <p:notesSz cx="6858000" cy="9144000"/>
@@ -284,7 +285,7 @@
           <a:p>
             <a:fld id="{CB61FE93-40E5-4B90-8B3A-E7F187B3D00B}" type="datetimeFigureOut">
               <a:rPr lang="en-CA" smtClean="0"/>
-              <a:t>2022-11-10</a:t>
+              <a:t>2022-11-15</a:t>
             </a:fld>
             <a:endParaRPr lang="en-CA"/>
           </a:p>
@@ -484,7 +485,7 @@
           <a:p>
             <a:fld id="{CB61FE93-40E5-4B90-8B3A-E7F187B3D00B}" type="datetimeFigureOut">
               <a:rPr lang="en-CA" smtClean="0"/>
-              <a:t>2022-11-10</a:t>
+              <a:t>2022-11-15</a:t>
             </a:fld>
             <a:endParaRPr lang="en-CA"/>
           </a:p>
@@ -694,7 +695,7 @@
           <a:p>
             <a:fld id="{CB61FE93-40E5-4B90-8B3A-E7F187B3D00B}" type="datetimeFigureOut">
               <a:rPr lang="en-CA" smtClean="0"/>
-              <a:t>2022-11-10</a:t>
+              <a:t>2022-11-15</a:t>
             </a:fld>
             <a:endParaRPr lang="en-CA"/>
           </a:p>
@@ -894,7 +895,7 @@
           <a:p>
             <a:fld id="{CB61FE93-40E5-4B90-8B3A-E7F187B3D00B}" type="datetimeFigureOut">
               <a:rPr lang="en-CA" smtClean="0"/>
-              <a:t>2022-11-10</a:t>
+              <a:t>2022-11-15</a:t>
             </a:fld>
             <a:endParaRPr lang="en-CA"/>
           </a:p>
@@ -1170,7 +1171,7 @@
           <a:p>
             <a:fld id="{CB61FE93-40E5-4B90-8B3A-E7F187B3D00B}" type="datetimeFigureOut">
               <a:rPr lang="en-CA" smtClean="0"/>
-              <a:t>2022-11-10</a:t>
+              <a:t>2022-11-15</a:t>
             </a:fld>
             <a:endParaRPr lang="en-CA"/>
           </a:p>
@@ -1438,7 +1439,7 @@
           <a:p>
             <a:fld id="{CB61FE93-40E5-4B90-8B3A-E7F187B3D00B}" type="datetimeFigureOut">
               <a:rPr lang="en-CA" smtClean="0"/>
-              <a:t>2022-11-10</a:t>
+              <a:t>2022-11-15</a:t>
             </a:fld>
             <a:endParaRPr lang="en-CA"/>
           </a:p>
@@ -1853,7 +1854,7 @@
           <a:p>
             <a:fld id="{CB61FE93-40E5-4B90-8B3A-E7F187B3D00B}" type="datetimeFigureOut">
               <a:rPr lang="en-CA" smtClean="0"/>
-              <a:t>2022-11-10</a:t>
+              <a:t>2022-11-15</a:t>
             </a:fld>
             <a:endParaRPr lang="en-CA"/>
           </a:p>
@@ -1995,7 +1996,7 @@
           <a:p>
             <a:fld id="{CB61FE93-40E5-4B90-8B3A-E7F187B3D00B}" type="datetimeFigureOut">
               <a:rPr lang="en-CA" smtClean="0"/>
-              <a:t>2022-11-10</a:t>
+              <a:t>2022-11-15</a:t>
             </a:fld>
             <a:endParaRPr lang="en-CA"/>
           </a:p>
@@ -2108,7 +2109,7 @@
           <a:p>
             <a:fld id="{CB61FE93-40E5-4B90-8B3A-E7F187B3D00B}" type="datetimeFigureOut">
               <a:rPr lang="en-CA" smtClean="0"/>
-              <a:t>2022-11-10</a:t>
+              <a:t>2022-11-15</a:t>
             </a:fld>
             <a:endParaRPr lang="en-CA"/>
           </a:p>
@@ -2421,7 +2422,7 @@
           <a:p>
             <a:fld id="{CB61FE93-40E5-4B90-8B3A-E7F187B3D00B}" type="datetimeFigureOut">
               <a:rPr lang="en-CA" smtClean="0"/>
-              <a:t>2022-11-10</a:t>
+              <a:t>2022-11-15</a:t>
             </a:fld>
             <a:endParaRPr lang="en-CA"/>
           </a:p>
@@ -2710,7 +2711,7 @@
           <a:p>
             <a:fld id="{CB61FE93-40E5-4B90-8B3A-E7F187B3D00B}" type="datetimeFigureOut">
               <a:rPr lang="en-CA" smtClean="0"/>
-              <a:t>2022-11-10</a:t>
+              <a:t>2022-11-15</a:t>
             </a:fld>
             <a:endParaRPr lang="en-CA"/>
           </a:p>
@@ -2953,7 +2954,7 @@
           <a:p>
             <a:fld id="{CB61FE93-40E5-4B90-8B3A-E7F187B3D00B}" type="datetimeFigureOut">
               <a:rPr lang="en-CA" smtClean="0"/>
-              <a:t>2022-11-10</a:t>
+              <a:t>2022-11-15</a:t>
             </a:fld>
             <a:endParaRPr lang="en-CA"/>
           </a:p>
@@ -3900,10 +3901,10 @@
       </p:grpSpPr>
       <p:sp>
         <p:nvSpPr>
-          <p:cNvPr id="7" name="TextBox 6">
-            <a:extLst>
-              <a:ext uri="{FF2B5EF4-FFF2-40B4-BE49-F238E27FC236}">
-                <a16:creationId xmlns:a16="http://schemas.microsoft.com/office/drawing/2014/main" id="{83D35964-B879-29E0-A265-ACDDA2AE1440}"/>
+          <p:cNvPr id="4" name="TextBox 3">
+            <a:extLst>
+              <a:ext uri="{FF2B5EF4-FFF2-40B4-BE49-F238E27FC236}">
+                <a16:creationId xmlns:a16="http://schemas.microsoft.com/office/drawing/2014/main" id="{0D8F948C-4C16-4068-32E9-BE7B50FA453E}"/>
               </a:ext>
             </a:extLst>
           </p:cNvPr>
@@ -3928,17 +3929,17 @@
           <a:p>
             <a:r>
               <a:rPr lang="en-CA" sz="2800" dirty="0"/>
-              <a:t>Proportion of mounts where females attempted to avoid that were successful</a:t>
+              <a:t>Proportion of mounts directed at females where females tried to evade</a:t>
             </a:r>
           </a:p>
         </p:txBody>
       </p:sp>
       <p:pic>
         <p:nvPicPr>
-          <p:cNvPr id="3" name="Picture 2">
-            <a:extLst>
-              <a:ext uri="{FF2B5EF4-FFF2-40B4-BE49-F238E27FC236}">
-                <a16:creationId xmlns:a16="http://schemas.microsoft.com/office/drawing/2014/main" id="{E0DA2BCC-437C-349B-A5D7-5EE3198D5420}"/>
+          <p:cNvPr id="5" name="Picture 4">
+            <a:extLst>
+              <a:ext uri="{FF2B5EF4-FFF2-40B4-BE49-F238E27FC236}">
+                <a16:creationId xmlns:a16="http://schemas.microsoft.com/office/drawing/2014/main" id="{E8633DFC-7A7B-A8E2-9082-A54B40A82820}"/>
               </a:ext>
             </a:extLst>
           </p:cNvPr>
@@ -3955,8 +3956,8 @@
         </p:blipFill>
         <p:spPr>
           <a:xfrm>
-            <a:off x="3395284" y="802896"/>
-            <a:ext cx="5783205" cy="5813804"/>
+            <a:off x="3376232" y="936243"/>
+            <a:ext cx="5767768" cy="5798072"/>
           </a:xfrm>
           <a:prstGeom prst="rect">
             <a:avLst/>
@@ -3966,7 +3967,7 @@
     </p:spTree>
     <p:extLst>
       <p:ext uri="{BB962C8B-B14F-4D97-AF65-F5344CB8AC3E}">
-        <p14:creationId xmlns:p14="http://schemas.microsoft.com/office/powerpoint/2010/main" val="4218799445"/>
+        <p14:creationId xmlns:p14="http://schemas.microsoft.com/office/powerpoint/2010/main" val="774785539"/>
       </p:ext>
     </p:extLst>
   </p:cSld>
@@ -3995,10 +3996,10 @@
       </p:grpSpPr>
       <p:sp>
         <p:nvSpPr>
-          <p:cNvPr id="2" name="TextBox 1">
-            <a:extLst>
-              <a:ext uri="{FF2B5EF4-FFF2-40B4-BE49-F238E27FC236}">
-                <a16:creationId xmlns:a16="http://schemas.microsoft.com/office/drawing/2014/main" id="{5FBCA0E6-712E-0FBF-FCC9-EC6D2E85E2DD}"/>
+          <p:cNvPr id="7" name="TextBox 6">
+            <a:extLst>
+              <a:ext uri="{FF2B5EF4-FFF2-40B4-BE49-F238E27FC236}">
+                <a16:creationId xmlns:a16="http://schemas.microsoft.com/office/drawing/2014/main" id="{83D35964-B879-29E0-A265-ACDDA2AE1440}"/>
               </a:ext>
             </a:extLst>
           </p:cNvPr>
@@ -4007,7 +4008,7 @@
         </p:nvSpPr>
         <p:spPr>
           <a:xfrm>
-            <a:off x="242614" y="202614"/>
+            <a:off x="242614" y="191982"/>
             <a:ext cx="11706771" cy="523220"/>
           </a:xfrm>
           <a:prstGeom prst="rect">
@@ -4023,17 +4024,17 @@
           <a:p>
             <a:r>
               <a:rPr lang="en-CA" sz="2800" dirty="0"/>
-              <a:t>Proportion of mounts directed at females that were evaded</a:t>
+              <a:t>Proportion of mounts where females attempted to avoid that were successful</a:t>
             </a:r>
           </a:p>
         </p:txBody>
       </p:sp>
       <p:pic>
         <p:nvPicPr>
-          <p:cNvPr id="4" name="Picture 3">
-            <a:extLst>
-              <a:ext uri="{FF2B5EF4-FFF2-40B4-BE49-F238E27FC236}">
-                <a16:creationId xmlns:a16="http://schemas.microsoft.com/office/drawing/2014/main" id="{41814A7C-A0FA-AB44-9AD6-F80479994A70}"/>
+          <p:cNvPr id="3" name="Picture 2">
+            <a:extLst>
+              <a:ext uri="{FF2B5EF4-FFF2-40B4-BE49-F238E27FC236}">
+                <a16:creationId xmlns:a16="http://schemas.microsoft.com/office/drawing/2014/main" id="{E0DA2BCC-437C-349B-A5D7-5EE3198D5420}"/>
               </a:ext>
             </a:extLst>
           </p:cNvPr>
@@ -4042,15 +4043,16 @@
           </p:cNvPicPr>
           <p:nvPr/>
         </p:nvPicPr>
-        <p:blipFill rotWithShape="1">
+        <p:blipFill>
           <a:blip r:embed="rId2"/>
-          <a:srcRect t="1015"/>
-          <a:stretch/>
+          <a:stretch>
+            <a:fillRect/>
+          </a:stretch>
         </p:blipFill>
         <p:spPr>
           <a:xfrm>
-            <a:off x="2846760" y="927652"/>
-            <a:ext cx="6078578" cy="5460752"/>
+            <a:off x="3395284" y="802896"/>
+            <a:ext cx="5783205" cy="5813804"/>
           </a:xfrm>
           <a:prstGeom prst="rect">
             <a:avLst/>
@@ -4060,7 +4062,7 @@
     </p:spTree>
     <p:extLst>
       <p:ext uri="{BB962C8B-B14F-4D97-AF65-F5344CB8AC3E}">
-        <p14:creationId xmlns:p14="http://schemas.microsoft.com/office/powerpoint/2010/main" val="4071322826"/>
+        <p14:creationId xmlns:p14="http://schemas.microsoft.com/office/powerpoint/2010/main" val="4218799445"/>
       </p:ext>
     </p:extLst>
   </p:cSld>
@@ -4089,10 +4091,10 @@
       </p:grpSpPr>
       <p:sp>
         <p:nvSpPr>
-          <p:cNvPr id="4" name="TextBox 3">
-            <a:extLst>
-              <a:ext uri="{FF2B5EF4-FFF2-40B4-BE49-F238E27FC236}">
-                <a16:creationId xmlns:a16="http://schemas.microsoft.com/office/drawing/2014/main" id="{A15D9475-3FA1-5658-49D0-90EE0465472B}"/>
+          <p:cNvPr id="2" name="TextBox 1">
+            <a:extLst>
+              <a:ext uri="{FF2B5EF4-FFF2-40B4-BE49-F238E27FC236}">
+                <a16:creationId xmlns:a16="http://schemas.microsoft.com/office/drawing/2014/main" id="{5FBCA0E6-712E-0FBF-FCC9-EC6D2E85E2DD}"/>
               </a:ext>
             </a:extLst>
           </p:cNvPr>
@@ -4101,7 +4103,7 @@
         </p:nvSpPr>
         <p:spPr>
           <a:xfrm>
-            <a:off x="242614" y="191982"/>
+            <a:off x="242614" y="202614"/>
             <a:ext cx="11706771" cy="523220"/>
           </a:xfrm>
           <a:prstGeom prst="rect">
@@ -4117,17 +4119,17 @@
           <a:p>
             <a:r>
               <a:rPr lang="en-CA" sz="2800" dirty="0"/>
-              <a:t>Proportion of mounts aborted where males had the choice to abort</a:t>
+              <a:t>Proportion of mounts directed at females that were evaded</a:t>
             </a:r>
           </a:p>
         </p:txBody>
       </p:sp>
       <p:pic>
         <p:nvPicPr>
-          <p:cNvPr id="3" name="Picture 2">
-            <a:extLst>
-              <a:ext uri="{FF2B5EF4-FFF2-40B4-BE49-F238E27FC236}">
-                <a16:creationId xmlns:a16="http://schemas.microsoft.com/office/drawing/2014/main" id="{3D6FA5CC-BD46-FBD3-E84A-71FB160FEEC2}"/>
+          <p:cNvPr id="4" name="Picture 3">
+            <a:extLst>
+              <a:ext uri="{FF2B5EF4-FFF2-40B4-BE49-F238E27FC236}">
+                <a16:creationId xmlns:a16="http://schemas.microsoft.com/office/drawing/2014/main" id="{41814A7C-A0FA-AB44-9AD6-F80479994A70}"/>
               </a:ext>
             </a:extLst>
           </p:cNvPr>
@@ -4136,16 +4138,15 @@
           </p:cNvPicPr>
           <p:nvPr/>
         </p:nvPicPr>
-        <p:blipFill>
+        <p:blipFill rotWithShape="1">
           <a:blip r:embed="rId2"/>
-          <a:stretch>
-            <a:fillRect/>
-          </a:stretch>
+          <a:srcRect t="1015"/>
+          <a:stretch/>
         </p:blipFill>
         <p:spPr>
           <a:xfrm>
-            <a:off x="2753666" y="826696"/>
-            <a:ext cx="6449970" cy="5839322"/>
+            <a:off x="2846760" y="927652"/>
+            <a:ext cx="6078578" cy="5460752"/>
           </a:xfrm>
           <a:prstGeom prst="rect">
             <a:avLst/>
@@ -4155,7 +4156,7 @@
     </p:spTree>
     <p:extLst>
       <p:ext uri="{BB962C8B-B14F-4D97-AF65-F5344CB8AC3E}">
-        <p14:creationId xmlns:p14="http://schemas.microsoft.com/office/powerpoint/2010/main" val="2166282056"/>
+        <p14:creationId xmlns:p14="http://schemas.microsoft.com/office/powerpoint/2010/main" val="4071322826"/>
       </p:ext>
     </p:extLst>
   </p:cSld>
@@ -4187,7 +4188,7 @@
           <p:cNvPr id="4" name="TextBox 3">
             <a:extLst>
               <a:ext uri="{FF2B5EF4-FFF2-40B4-BE49-F238E27FC236}">
-                <a16:creationId xmlns:a16="http://schemas.microsoft.com/office/drawing/2014/main" id="{89528861-0873-5C1D-F48A-A4D17DFEB931}"/>
+                <a16:creationId xmlns:a16="http://schemas.microsoft.com/office/drawing/2014/main" id="{A15D9475-3FA1-5658-49D0-90EE0465472B}"/>
               </a:ext>
             </a:extLst>
           </p:cNvPr>
@@ -4212,7 +4213,7 @@
           <a:p>
             <a:r>
               <a:rPr lang="en-CA" sz="2800" dirty="0"/>
-              <a:t>Proportion of all mounts that resulted in insemination</a:t>
+              <a:t>Proportion of mounts aborted where males had the choice to abort</a:t>
             </a:r>
           </a:p>
         </p:txBody>
@@ -4222,7 +4223,7 @@
           <p:cNvPr id="3" name="Picture 2">
             <a:extLst>
               <a:ext uri="{FF2B5EF4-FFF2-40B4-BE49-F238E27FC236}">
-                <a16:creationId xmlns:a16="http://schemas.microsoft.com/office/drawing/2014/main" id="{BCE11C09-D1FE-E5CE-5CBF-E6214F51FA8B}"/>
+                <a16:creationId xmlns:a16="http://schemas.microsoft.com/office/drawing/2014/main" id="{3D6FA5CC-BD46-FBD3-E84A-71FB160FEEC2}"/>
               </a:ext>
             </a:extLst>
           </p:cNvPr>
@@ -4239,8 +4240,8 @@
         </p:blipFill>
         <p:spPr>
           <a:xfrm>
-            <a:off x="2684743" y="715202"/>
-            <a:ext cx="6576878" cy="5950816"/>
+            <a:off x="2753666" y="826696"/>
+            <a:ext cx="6449970" cy="5839322"/>
           </a:xfrm>
           <a:prstGeom prst="rect">
             <a:avLst/>
@@ -4250,7 +4251,7 @@
     </p:spTree>
     <p:extLst>
       <p:ext uri="{BB962C8B-B14F-4D97-AF65-F5344CB8AC3E}">
-        <p14:creationId xmlns:p14="http://schemas.microsoft.com/office/powerpoint/2010/main" val="3422684493"/>
+        <p14:creationId xmlns:p14="http://schemas.microsoft.com/office/powerpoint/2010/main" val="2166282056"/>
       </p:ext>
     </p:extLst>
   </p:cSld>
@@ -4282,6 +4283,101 @@
           <p:cNvPr id="4" name="TextBox 3">
             <a:extLst>
               <a:ext uri="{FF2B5EF4-FFF2-40B4-BE49-F238E27FC236}">
+                <a16:creationId xmlns:a16="http://schemas.microsoft.com/office/drawing/2014/main" id="{89528861-0873-5C1D-F48A-A4D17DFEB931}"/>
+              </a:ext>
+            </a:extLst>
+          </p:cNvPr>
+          <p:cNvSpPr txBox="1"/>
+          <p:nvPr/>
+        </p:nvSpPr>
+        <p:spPr>
+          <a:xfrm>
+            <a:off x="242614" y="191982"/>
+            <a:ext cx="11706771" cy="523220"/>
+          </a:xfrm>
+          <a:prstGeom prst="rect">
+            <a:avLst/>
+          </a:prstGeom>
+          <a:noFill/>
+        </p:spPr>
+        <p:txBody>
+          <a:bodyPr wrap="square">
+            <a:spAutoFit/>
+          </a:bodyPr>
+          <a:lstStyle/>
+          <a:p>
+            <a:r>
+              <a:rPr lang="en-CA" sz="2800" dirty="0"/>
+              <a:t>Proportion of all mounts that resulted in insemination</a:t>
+            </a:r>
+          </a:p>
+        </p:txBody>
+      </p:sp>
+      <p:pic>
+        <p:nvPicPr>
+          <p:cNvPr id="3" name="Picture 2">
+            <a:extLst>
+              <a:ext uri="{FF2B5EF4-FFF2-40B4-BE49-F238E27FC236}">
+                <a16:creationId xmlns:a16="http://schemas.microsoft.com/office/drawing/2014/main" id="{BCE11C09-D1FE-E5CE-5CBF-E6214F51FA8B}"/>
+              </a:ext>
+            </a:extLst>
+          </p:cNvPr>
+          <p:cNvPicPr>
+            <a:picLocks noChangeAspect="1"/>
+          </p:cNvPicPr>
+          <p:nvPr/>
+        </p:nvPicPr>
+        <p:blipFill>
+          <a:blip r:embed="rId2"/>
+          <a:stretch>
+            <a:fillRect/>
+          </a:stretch>
+        </p:blipFill>
+        <p:spPr>
+          <a:xfrm>
+            <a:off x="2684743" y="715202"/>
+            <a:ext cx="6576878" cy="5950816"/>
+          </a:xfrm>
+          <a:prstGeom prst="rect">
+            <a:avLst/>
+          </a:prstGeom>
+        </p:spPr>
+      </p:pic>
+    </p:spTree>
+    <p:extLst>
+      <p:ext uri="{BB962C8B-B14F-4D97-AF65-F5344CB8AC3E}">
+        <p14:creationId xmlns:p14="http://schemas.microsoft.com/office/powerpoint/2010/main" val="3422684493"/>
+      </p:ext>
+    </p:extLst>
+  </p:cSld>
+  <p:clrMapOvr>
+    <a:masterClrMapping/>
+  </p:clrMapOvr>
+</p:sld>
+</file>
+
+<file path=ppt/slides/slide15.xml><?xml version="1.0" encoding="utf-8"?>
+<p:sld xmlns:a="http://schemas.openxmlformats.org/drawingml/2006/main" xmlns:r="http://schemas.openxmlformats.org/officeDocument/2006/relationships" xmlns:p="http://schemas.openxmlformats.org/presentationml/2006/main">
+  <p:cSld>
+    <p:spTree>
+      <p:nvGrpSpPr>
+        <p:cNvPr id="1" name=""/>
+        <p:cNvGrpSpPr/>
+        <p:nvPr/>
+      </p:nvGrpSpPr>
+      <p:grpSpPr>
+        <a:xfrm>
+          <a:off x="0" y="0"/>
+          <a:ext cx="0" cy="0"/>
+          <a:chOff x="0" y="0"/>
+          <a:chExt cx="0" cy="0"/>
+        </a:xfrm>
+      </p:grpSpPr>
+      <p:sp>
+        <p:nvSpPr>
+          <p:cNvPr id="4" name="TextBox 3">
+            <a:extLst>
+              <a:ext uri="{FF2B5EF4-FFF2-40B4-BE49-F238E27FC236}">
                 <a16:creationId xmlns:a16="http://schemas.microsoft.com/office/drawing/2014/main" id="{720F8BF1-F2AC-921A-D83F-C74C126D9D47}"/>
               </a:ext>
             </a:extLst>
@@ -4355,7 +4451,7 @@
 </p:sld>
 </file>
 
-<file path=ppt/slides/slide15.xml><?xml version="1.0" encoding="utf-8"?>
+<file path=ppt/slides/slide16.xml><?xml version="1.0" encoding="utf-8"?>
 <p:sld xmlns:a="http://schemas.openxmlformats.org/drawingml/2006/main" xmlns:r="http://schemas.openxmlformats.org/officeDocument/2006/relationships" xmlns:p="http://schemas.openxmlformats.org/presentationml/2006/main">
   <p:cSld>
     <p:spTree>
@@ -4838,7 +4934,7 @@
 </p:sld>
 </file>
 
-<file path=ppt/slides/slide16.xml><?xml version="1.0" encoding="utf-8"?>
+<file path=ppt/slides/slide17.xml><?xml version="1.0" encoding="utf-8"?>
 <p:sld xmlns:a="http://schemas.openxmlformats.org/drawingml/2006/main" xmlns:r="http://schemas.openxmlformats.org/officeDocument/2006/relationships" xmlns:p="http://schemas.openxmlformats.org/presentationml/2006/main">
   <p:cSld>
     <p:spTree>
@@ -5321,7 +5417,7 @@
 </p:sld>
 </file>
 
-<file path=ppt/slides/slide17.xml><?xml version="1.0" encoding="utf-8"?>
+<file path=ppt/slides/slide18.xml><?xml version="1.0" encoding="utf-8"?>
 <p:sld xmlns:a="http://schemas.openxmlformats.org/drawingml/2006/main" xmlns:r="http://schemas.openxmlformats.org/officeDocument/2006/relationships" xmlns:p="http://schemas.openxmlformats.org/presentationml/2006/main">
   <p:cSld>
     <p:spTree>
@@ -5804,7 +5900,7 @@
 </p:sld>
 </file>
 
-<file path=ppt/slides/slide18.xml><?xml version="1.0" encoding="utf-8"?>
+<file path=ppt/slides/slide19.xml><?xml version="1.0" encoding="utf-8"?>
 <p:sld xmlns:a="http://schemas.openxmlformats.org/drawingml/2006/main" xmlns:r="http://schemas.openxmlformats.org/officeDocument/2006/relationships" xmlns:p="http://schemas.openxmlformats.org/presentationml/2006/main">
   <p:cSld>
     <p:spTree>
@@ -8416,12 +8512,300 @@
           <a:chExt cx="0" cy="0"/>
         </a:xfrm>
       </p:grpSpPr>
-      <p:sp>
-        <p:nvSpPr>
-          <p:cNvPr id="2" name="TextBox 1">
-            <a:extLst>
-              <a:ext uri="{FF2B5EF4-FFF2-40B4-BE49-F238E27FC236}">
-                <a16:creationId xmlns:a16="http://schemas.microsoft.com/office/drawing/2014/main" id="{C456DF4F-32CA-79AC-854F-B198CDD95AB0}"/>
+      <p:grpSp>
+        <p:nvGrpSpPr>
+          <p:cNvPr id="4" name="Group 3">
+            <a:extLst>
+              <a:ext uri="{FF2B5EF4-FFF2-40B4-BE49-F238E27FC236}">
+                <a16:creationId xmlns:a16="http://schemas.microsoft.com/office/drawing/2014/main" id="{EE927B0E-0AE7-CAB1-A8C6-702B9DBD9523}"/>
+              </a:ext>
+            </a:extLst>
+          </p:cNvPr>
+          <p:cNvGrpSpPr/>
+          <p:nvPr/>
+        </p:nvGrpSpPr>
+        <p:grpSpPr>
+          <a:xfrm>
+            <a:off x="9677847" y="129451"/>
+            <a:ext cx="2514153" cy="1399829"/>
+            <a:chOff x="6923562" y="2710726"/>
+            <a:chExt cx="2514153" cy="1399829"/>
+          </a:xfrm>
+        </p:grpSpPr>
+        <p:sp>
+          <p:nvSpPr>
+            <p:cNvPr id="5" name="Oval 4">
+              <a:extLst>
+                <a:ext uri="{FF2B5EF4-FFF2-40B4-BE49-F238E27FC236}">
+                  <a16:creationId xmlns:a16="http://schemas.microsoft.com/office/drawing/2014/main" id="{9C69DA33-009E-E13C-CEE7-A048EDDA38F3}"/>
+                </a:ext>
+              </a:extLst>
+            </p:cNvPr>
+            <p:cNvSpPr/>
+            <p:nvPr/>
+          </p:nvSpPr>
+          <p:spPr>
+            <a:xfrm>
+              <a:off x="6923562" y="2745610"/>
+              <a:ext cx="399011" cy="371302"/>
+            </a:xfrm>
+            <a:prstGeom prst="ellipse">
+              <a:avLst/>
+            </a:prstGeom>
+            <a:solidFill>
+              <a:srgbClr val="BFEFFF"/>
+            </a:solidFill>
+            <a:ln>
+              <a:solidFill>
+                <a:schemeClr val="tx1"/>
+              </a:solidFill>
+            </a:ln>
+          </p:spPr>
+          <p:style>
+            <a:lnRef idx="2">
+              <a:schemeClr val="accent1">
+                <a:shade val="50000"/>
+              </a:schemeClr>
+            </a:lnRef>
+            <a:fillRef idx="1">
+              <a:schemeClr val="accent1"/>
+            </a:fillRef>
+            <a:effectRef idx="0">
+              <a:schemeClr val="accent1"/>
+            </a:effectRef>
+            <a:fontRef idx="minor">
+              <a:schemeClr val="lt1"/>
+            </a:fontRef>
+          </p:style>
+          <p:txBody>
+            <a:bodyPr rtlCol="0" anchor="ctr"/>
+            <a:lstStyle/>
+            <a:p>
+              <a:pPr algn="ctr"/>
+              <a:endParaRPr lang="en-CA"/>
+            </a:p>
+          </p:txBody>
+        </p:sp>
+        <p:sp>
+          <p:nvSpPr>
+            <p:cNvPr id="6" name="Oval 5">
+              <a:extLst>
+                <a:ext uri="{FF2B5EF4-FFF2-40B4-BE49-F238E27FC236}">
+                  <a16:creationId xmlns:a16="http://schemas.microsoft.com/office/drawing/2014/main" id="{66818D10-5A9A-E170-132C-FB324465B5DD}"/>
+                </a:ext>
+              </a:extLst>
+            </p:cNvPr>
+            <p:cNvSpPr/>
+            <p:nvPr/>
+          </p:nvSpPr>
+          <p:spPr>
+            <a:xfrm>
+              <a:off x="6923562" y="3243349"/>
+              <a:ext cx="399011" cy="371302"/>
+            </a:xfrm>
+            <a:prstGeom prst="ellipse">
+              <a:avLst/>
+            </a:prstGeom>
+            <a:solidFill>
+              <a:srgbClr val="00688B"/>
+            </a:solidFill>
+            <a:ln>
+              <a:solidFill>
+                <a:schemeClr val="tx1"/>
+              </a:solidFill>
+            </a:ln>
+          </p:spPr>
+          <p:style>
+            <a:lnRef idx="2">
+              <a:schemeClr val="accent1">
+                <a:shade val="50000"/>
+              </a:schemeClr>
+            </a:lnRef>
+            <a:fillRef idx="1">
+              <a:schemeClr val="accent1"/>
+            </a:fillRef>
+            <a:effectRef idx="0">
+              <a:schemeClr val="accent1"/>
+            </a:effectRef>
+            <a:fontRef idx="minor">
+              <a:schemeClr val="lt1"/>
+            </a:fontRef>
+          </p:style>
+          <p:txBody>
+            <a:bodyPr rtlCol="0" anchor="ctr"/>
+            <a:lstStyle/>
+            <a:p>
+              <a:pPr algn="ctr"/>
+              <a:endParaRPr lang="en-CA"/>
+            </a:p>
+          </p:txBody>
+        </p:sp>
+        <p:sp>
+          <p:nvSpPr>
+            <p:cNvPr id="7" name="Oval 6">
+              <a:extLst>
+                <a:ext uri="{FF2B5EF4-FFF2-40B4-BE49-F238E27FC236}">
+                  <a16:creationId xmlns:a16="http://schemas.microsoft.com/office/drawing/2014/main" id="{D31C986E-8417-2EBA-AAA6-AFA7F0EB1999}"/>
+                </a:ext>
+              </a:extLst>
+            </p:cNvPr>
+            <p:cNvSpPr/>
+            <p:nvPr/>
+          </p:nvSpPr>
+          <p:spPr>
+            <a:xfrm>
+              <a:off x="6923563" y="3738688"/>
+              <a:ext cx="399011" cy="371302"/>
+            </a:xfrm>
+            <a:prstGeom prst="ellipse">
+              <a:avLst/>
+            </a:prstGeom>
+            <a:solidFill>
+              <a:srgbClr val="F4A460"/>
+            </a:solidFill>
+            <a:ln>
+              <a:solidFill>
+                <a:schemeClr val="tx1"/>
+              </a:solidFill>
+            </a:ln>
+          </p:spPr>
+          <p:style>
+            <a:lnRef idx="2">
+              <a:schemeClr val="accent1">
+                <a:shade val="50000"/>
+              </a:schemeClr>
+            </a:lnRef>
+            <a:fillRef idx="1">
+              <a:schemeClr val="accent1"/>
+            </a:fillRef>
+            <a:effectRef idx="0">
+              <a:schemeClr val="accent1"/>
+            </a:effectRef>
+            <a:fontRef idx="minor">
+              <a:schemeClr val="lt1"/>
+            </a:fontRef>
+          </p:style>
+          <p:txBody>
+            <a:bodyPr rtlCol="0" anchor="ctr"/>
+            <a:lstStyle/>
+            <a:p>
+              <a:pPr algn="ctr"/>
+              <a:endParaRPr lang="en-CA"/>
+            </a:p>
+          </p:txBody>
+        </p:sp>
+        <p:sp>
+          <p:nvSpPr>
+            <p:cNvPr id="8" name="TextBox 7">
+              <a:extLst>
+                <a:ext uri="{FF2B5EF4-FFF2-40B4-BE49-F238E27FC236}">
+                  <a16:creationId xmlns:a16="http://schemas.microsoft.com/office/drawing/2014/main" id="{3E167354-EFEA-3135-DCA2-7F95F1C2D824}"/>
+                </a:ext>
+              </a:extLst>
+            </p:cNvPr>
+            <p:cNvSpPr txBox="1"/>
+            <p:nvPr/>
+          </p:nvSpPr>
+          <p:spPr>
+            <a:xfrm>
+              <a:off x="7322573" y="2710726"/>
+              <a:ext cx="1690926" cy="406186"/>
+            </a:xfrm>
+            <a:prstGeom prst="rect">
+              <a:avLst/>
+            </a:prstGeom>
+            <a:noFill/>
+          </p:spPr>
+          <p:txBody>
+            <a:bodyPr wrap="square" rtlCol="0">
+              <a:spAutoFit/>
+            </a:bodyPr>
+            <a:lstStyle/>
+            <a:p>
+              <a:r>
+                <a:rPr lang="en-CA" sz="2000" dirty="0"/>
+                <a:t>Isolated male</a:t>
+              </a:r>
+            </a:p>
+          </p:txBody>
+        </p:sp>
+        <p:sp>
+          <p:nvSpPr>
+            <p:cNvPr id="9" name="TextBox 8">
+              <a:extLst>
+                <a:ext uri="{FF2B5EF4-FFF2-40B4-BE49-F238E27FC236}">
+                  <a16:creationId xmlns:a16="http://schemas.microsoft.com/office/drawing/2014/main" id="{CF31FEB9-1B54-2CCD-91C8-E59544101825}"/>
+                </a:ext>
+              </a:extLst>
+            </p:cNvPr>
+            <p:cNvSpPr txBox="1"/>
+            <p:nvPr/>
+          </p:nvSpPr>
+          <p:spPr>
+            <a:xfrm>
+              <a:off x="7322572" y="3204309"/>
+              <a:ext cx="2115143" cy="400110"/>
+            </a:xfrm>
+            <a:prstGeom prst="rect">
+              <a:avLst/>
+            </a:prstGeom>
+            <a:noFill/>
+          </p:spPr>
+          <p:txBody>
+            <a:bodyPr wrap="square" rtlCol="0">
+              <a:spAutoFit/>
+            </a:bodyPr>
+            <a:lstStyle/>
+            <a:p>
+              <a:r>
+                <a:rPr lang="en-CA" sz="2000" dirty="0"/>
+                <a:t>Experienced male</a:t>
+              </a:r>
+            </a:p>
+          </p:txBody>
+        </p:sp>
+        <p:sp>
+          <p:nvSpPr>
+            <p:cNvPr id="10" name="TextBox 9">
+              <a:extLst>
+                <a:ext uri="{FF2B5EF4-FFF2-40B4-BE49-F238E27FC236}">
+                  <a16:creationId xmlns:a16="http://schemas.microsoft.com/office/drawing/2014/main" id="{2288A3F6-40D0-0B85-5211-15B10B5314E9}"/>
+                </a:ext>
+              </a:extLst>
+            </p:cNvPr>
+            <p:cNvSpPr txBox="1"/>
+            <p:nvPr/>
+          </p:nvSpPr>
+          <p:spPr>
+            <a:xfrm>
+              <a:off x="7322572" y="3710445"/>
+              <a:ext cx="2115143" cy="400110"/>
+            </a:xfrm>
+            <a:prstGeom prst="rect">
+              <a:avLst/>
+            </a:prstGeom>
+            <a:noFill/>
+          </p:spPr>
+          <p:txBody>
+            <a:bodyPr wrap="square" rtlCol="0">
+              <a:spAutoFit/>
+            </a:bodyPr>
+            <a:lstStyle/>
+            <a:p>
+              <a:r>
+                <a:rPr lang="en-CA" sz="2000" dirty="0"/>
+                <a:t>Female</a:t>
+              </a:r>
+            </a:p>
+          </p:txBody>
+        </p:sp>
+      </p:grpSp>
+      <p:sp>
+        <p:nvSpPr>
+          <p:cNvPr id="11" name="TextBox 10">
+            <a:extLst>
+              <a:ext uri="{FF2B5EF4-FFF2-40B4-BE49-F238E27FC236}">
+                <a16:creationId xmlns:a16="http://schemas.microsoft.com/office/drawing/2014/main" id="{285AF44C-119B-2ED6-E94D-27036B7A293A}"/>
               </a:ext>
             </a:extLst>
           </p:cNvPr>
@@ -8430,8 +8814,8 @@
         </p:nvSpPr>
         <p:spPr>
           <a:xfrm>
-            <a:off x="242614" y="191982"/>
-            <a:ext cx="11706771" cy="523220"/>
+            <a:off x="176712" y="199998"/>
+            <a:ext cx="7012858" cy="523220"/>
           </a:xfrm>
           <a:prstGeom prst="rect">
             <a:avLst/>
@@ -8439,24 +8823,139 @@
           <a:noFill/>
         </p:spPr>
         <p:txBody>
-          <a:bodyPr wrap="square">
+          <a:bodyPr wrap="square" rtlCol="0">
             <a:spAutoFit/>
           </a:bodyPr>
           <a:lstStyle/>
           <a:p>
             <a:r>
               <a:rPr lang="en-CA" sz="2800" dirty="0"/>
-              <a:t>Total mounts performed</a:t>
-            </a:r>
+              <a:t>Replicate 6 networks (all days)</a:t>
+            </a:r>
+          </a:p>
+        </p:txBody>
+      </p:sp>
+      <p:sp>
+        <p:nvSpPr>
+          <p:cNvPr id="12" name="TextBox 11">
+            <a:extLst>
+              <a:ext uri="{FF2B5EF4-FFF2-40B4-BE49-F238E27FC236}">
+                <a16:creationId xmlns:a16="http://schemas.microsoft.com/office/drawing/2014/main" id="{DBB43D55-F2CE-212D-3A8E-39EEBE37CA31}"/>
+              </a:ext>
+            </a:extLst>
+          </p:cNvPr>
+          <p:cNvSpPr txBox="1"/>
+          <p:nvPr/>
+        </p:nvSpPr>
+        <p:spPr>
+          <a:xfrm>
+            <a:off x="728502" y="5499468"/>
+            <a:ext cx="4102290" cy="1077218"/>
+          </a:xfrm>
+          <a:prstGeom prst="rect">
+            <a:avLst/>
+          </a:prstGeom>
+          <a:noFill/>
+        </p:spPr>
+        <p:txBody>
+          <a:bodyPr wrap="square" rtlCol="0">
+            <a:spAutoFit/>
+          </a:bodyPr>
+          <a:lstStyle/>
+          <a:p>
+            <a:r>
+              <a:rPr lang="en-CA" sz="2400" dirty="0"/>
+              <a:t>Directed </a:t>
+            </a:r>
+            <a:r>
+              <a:rPr lang="en-CA" sz="2400" b="1" dirty="0"/>
+              <a:t>mount</a:t>
+            </a:r>
+            <a:r>
+              <a:rPr lang="en-CA" sz="2400" dirty="0"/>
+              <a:t> network </a:t>
+            </a:r>
+            <a:br>
+              <a:rPr lang="en-CA" sz="2400" dirty="0"/>
+            </a:br>
+            <a:r>
+              <a:rPr lang="en-CA" sz="2000" dirty="0"/>
+              <a:t>Node size: Out-strength for males; </a:t>
+            </a:r>
+          </a:p>
+          <a:p>
+            <a:r>
+              <a:rPr lang="en-CA" sz="2000" dirty="0"/>
+              <a:t>                    In-strength for females</a:t>
+            </a:r>
+            <a:endParaRPr lang="en-CA" sz="2400" dirty="0"/>
+          </a:p>
+        </p:txBody>
+      </p:sp>
+      <p:sp>
+        <p:nvSpPr>
+          <p:cNvPr id="15" name="TextBox 14">
+            <a:extLst>
+              <a:ext uri="{FF2B5EF4-FFF2-40B4-BE49-F238E27FC236}">
+                <a16:creationId xmlns:a16="http://schemas.microsoft.com/office/drawing/2014/main" id="{BDF52028-0B95-23CE-6A64-A2FFE254F4FD}"/>
+              </a:ext>
+            </a:extLst>
+          </p:cNvPr>
+          <p:cNvSpPr txBox="1"/>
+          <p:nvPr/>
+        </p:nvSpPr>
+        <p:spPr>
+          <a:xfrm>
+            <a:off x="5481493" y="5480632"/>
+            <a:ext cx="6434282" cy="1077218"/>
+          </a:xfrm>
+          <a:prstGeom prst="rect">
+            <a:avLst/>
+          </a:prstGeom>
+          <a:noFill/>
+        </p:spPr>
+        <p:txBody>
+          <a:bodyPr wrap="square" rtlCol="0">
+            <a:spAutoFit/>
+          </a:bodyPr>
+          <a:lstStyle/>
+          <a:p>
+            <a:r>
+              <a:rPr lang="en-CA" sz="2400" dirty="0"/>
+              <a:t>Directed </a:t>
+            </a:r>
+            <a:r>
+              <a:rPr lang="en-CA" sz="2400" b="1" dirty="0"/>
+              <a:t>insemination</a:t>
+            </a:r>
+            <a:r>
+              <a:rPr lang="en-CA" sz="2400" dirty="0"/>
+              <a:t> network </a:t>
+            </a:r>
+            <a:br>
+              <a:rPr lang="en-CA" sz="2400" dirty="0"/>
+            </a:br>
+            <a:r>
+              <a:rPr lang="en-CA" sz="2000" dirty="0"/>
+              <a:t>Node size: Out-strength for males;</a:t>
+            </a:r>
+            <a:br>
+              <a:rPr lang="en-CA" sz="2000" dirty="0"/>
+            </a:br>
+            <a:r>
+              <a:rPr lang="en-CA" sz="2000" dirty="0"/>
+              <a:t>	    In-strength for females</a:t>
+            </a:r>
+            <a:endParaRPr lang="en-CA" sz="2400" dirty="0"/>
           </a:p>
         </p:txBody>
       </p:sp>
       <p:pic>
         <p:nvPicPr>
-          <p:cNvPr id="10" name="Picture 9">
-            <a:extLst>
-              <a:ext uri="{FF2B5EF4-FFF2-40B4-BE49-F238E27FC236}">
-                <a16:creationId xmlns:a16="http://schemas.microsoft.com/office/drawing/2014/main" id="{B5396E68-D1C2-ECB6-A234-428DF375839F}"/>
+          <p:cNvPr id="3" name="Picture 2">
+            <a:extLst>
+              <a:ext uri="{FF2B5EF4-FFF2-40B4-BE49-F238E27FC236}">
+                <a16:creationId xmlns:a16="http://schemas.microsoft.com/office/drawing/2014/main" id="{2737E211-944A-1D58-CE53-21F4A08222B1}"/>
               </a:ext>
             </a:extLst>
           </p:cNvPr>
@@ -8473,8 +8972,38 @@
         </p:blipFill>
         <p:spPr>
           <a:xfrm>
-            <a:off x="3639764" y="993396"/>
-            <a:ext cx="5344271" cy="5430008"/>
+            <a:off x="5359923" y="823089"/>
+            <a:ext cx="4317924" cy="4246820"/>
+          </a:xfrm>
+          <a:prstGeom prst="rect">
+            <a:avLst/>
+          </a:prstGeom>
+        </p:spPr>
+      </p:pic>
+      <p:pic>
+        <p:nvPicPr>
+          <p:cNvPr id="16" name="Picture 15">
+            <a:extLst>
+              <a:ext uri="{FF2B5EF4-FFF2-40B4-BE49-F238E27FC236}">
+                <a16:creationId xmlns:a16="http://schemas.microsoft.com/office/drawing/2014/main" id="{12BF32C3-AE62-5A99-567D-2CE8981D74CC}"/>
+              </a:ext>
+            </a:extLst>
+          </p:cNvPr>
+          <p:cNvPicPr>
+            <a:picLocks noChangeAspect="1"/>
+          </p:cNvPicPr>
+          <p:nvPr/>
+        </p:nvPicPr>
+        <p:blipFill>
+          <a:blip r:embed="rId3"/>
+          <a:stretch>
+            <a:fillRect/>
+          </a:stretch>
+        </p:blipFill>
+        <p:spPr>
+          <a:xfrm>
+            <a:off x="490550" y="723218"/>
+            <a:ext cx="4685557" cy="4612230"/>
           </a:xfrm>
           <a:prstGeom prst="rect">
             <a:avLst/>
@@ -8484,7 +9013,7 @@
     </p:spTree>
     <p:extLst>
       <p:ext uri="{BB962C8B-B14F-4D97-AF65-F5344CB8AC3E}">
-        <p14:creationId xmlns:p14="http://schemas.microsoft.com/office/powerpoint/2010/main" val="3241141293"/>
+        <p14:creationId xmlns:p14="http://schemas.microsoft.com/office/powerpoint/2010/main" val="134579529"/>
       </p:ext>
     </p:extLst>
   </p:cSld>
@@ -8516,7 +9045,7 @@
           <p:cNvPr id="2" name="TextBox 1">
             <a:extLst>
               <a:ext uri="{FF2B5EF4-FFF2-40B4-BE49-F238E27FC236}">
-                <a16:creationId xmlns:a16="http://schemas.microsoft.com/office/drawing/2014/main" id="{501EB813-4FAA-31E0-AFB8-D207072C2FB5}"/>
+                <a16:creationId xmlns:a16="http://schemas.microsoft.com/office/drawing/2014/main" id="{C456DF4F-32CA-79AC-854F-B198CDD95AB0}"/>
               </a:ext>
             </a:extLst>
           </p:cNvPr>
@@ -8541,17 +9070,17 @@
           <a:p>
             <a:r>
               <a:rPr lang="en-CA" sz="2800" dirty="0"/>
-              <a:t>Total inseminations</a:t>
+              <a:t>Total mounts performed</a:t>
             </a:r>
           </a:p>
         </p:txBody>
       </p:sp>
       <p:pic>
         <p:nvPicPr>
-          <p:cNvPr id="4" name="Picture 3">
-            <a:extLst>
-              <a:ext uri="{FF2B5EF4-FFF2-40B4-BE49-F238E27FC236}">
-                <a16:creationId xmlns:a16="http://schemas.microsoft.com/office/drawing/2014/main" id="{F9C0C7CC-C86C-DCFD-26BB-15EC30AA5BC5}"/>
+          <p:cNvPr id="10" name="Picture 9">
+            <a:extLst>
+              <a:ext uri="{FF2B5EF4-FFF2-40B4-BE49-F238E27FC236}">
+                <a16:creationId xmlns:a16="http://schemas.microsoft.com/office/drawing/2014/main" id="{B5396E68-D1C2-ECB6-A234-428DF375839F}"/>
               </a:ext>
             </a:extLst>
           </p:cNvPr>
@@ -8568,8 +9097,8 @@
         </p:blipFill>
         <p:spPr>
           <a:xfrm>
-            <a:off x="3161928" y="988635"/>
-            <a:ext cx="5334744" cy="5401429"/>
+            <a:off x="3639764" y="993396"/>
+            <a:ext cx="5344271" cy="5430008"/>
           </a:xfrm>
           <a:prstGeom prst="rect">
             <a:avLst/>
@@ -8579,7 +9108,7 @@
     </p:spTree>
     <p:extLst>
       <p:ext uri="{BB962C8B-B14F-4D97-AF65-F5344CB8AC3E}">
-        <p14:creationId xmlns:p14="http://schemas.microsoft.com/office/powerpoint/2010/main" val="377255432"/>
+        <p14:creationId xmlns:p14="http://schemas.microsoft.com/office/powerpoint/2010/main" val="3241141293"/>
       </p:ext>
     </p:extLst>
   </p:cSld>
@@ -8608,10 +9137,10 @@
       </p:grpSpPr>
       <p:sp>
         <p:nvSpPr>
-          <p:cNvPr id="4" name="TextBox 3">
-            <a:extLst>
-              <a:ext uri="{FF2B5EF4-FFF2-40B4-BE49-F238E27FC236}">
-                <a16:creationId xmlns:a16="http://schemas.microsoft.com/office/drawing/2014/main" id="{69EC9791-5CBB-2C5A-5052-FE5E376DA986}"/>
+          <p:cNvPr id="2" name="TextBox 1">
+            <a:extLst>
+              <a:ext uri="{FF2B5EF4-FFF2-40B4-BE49-F238E27FC236}">
+                <a16:creationId xmlns:a16="http://schemas.microsoft.com/office/drawing/2014/main" id="{501EB813-4FAA-31E0-AFB8-D207072C2FB5}"/>
               </a:ext>
             </a:extLst>
           </p:cNvPr>
@@ -8636,17 +9165,17 @@
           <a:p>
             <a:r>
               <a:rPr lang="en-CA" sz="2800" dirty="0"/>
-              <a:t>Proportion of mounts directed at other males</a:t>
+              <a:t>Total inseminations</a:t>
             </a:r>
           </a:p>
         </p:txBody>
       </p:sp>
       <p:pic>
         <p:nvPicPr>
-          <p:cNvPr id="5" name="Picture 4">
-            <a:extLst>
-              <a:ext uri="{FF2B5EF4-FFF2-40B4-BE49-F238E27FC236}">
-                <a16:creationId xmlns:a16="http://schemas.microsoft.com/office/drawing/2014/main" id="{C4649B12-ACB5-AEB6-28D5-A573725D98C1}"/>
+          <p:cNvPr id="4" name="Picture 3">
+            <a:extLst>
+              <a:ext uri="{FF2B5EF4-FFF2-40B4-BE49-F238E27FC236}">
+                <a16:creationId xmlns:a16="http://schemas.microsoft.com/office/drawing/2014/main" id="{F9C0C7CC-C86C-DCFD-26BB-15EC30AA5BC5}"/>
               </a:ext>
             </a:extLst>
           </p:cNvPr>
@@ -8663,8 +9192,8 @@
         </p:blipFill>
         <p:spPr>
           <a:xfrm>
-            <a:off x="3104774" y="761487"/>
-            <a:ext cx="5791575" cy="5904531"/>
+            <a:off x="3161928" y="988635"/>
+            <a:ext cx="5334744" cy="5401429"/>
           </a:xfrm>
           <a:prstGeom prst="rect">
             <a:avLst/>
@@ -8674,7 +9203,7 @@
     </p:spTree>
     <p:extLst>
       <p:ext uri="{BB962C8B-B14F-4D97-AF65-F5344CB8AC3E}">
-        <p14:creationId xmlns:p14="http://schemas.microsoft.com/office/powerpoint/2010/main" val="897322973"/>
+        <p14:creationId xmlns:p14="http://schemas.microsoft.com/office/powerpoint/2010/main" val="377255432"/>
       </p:ext>
     </p:extLst>
   </p:cSld>
@@ -8706,7 +9235,7 @@
           <p:cNvPr id="4" name="TextBox 3">
             <a:extLst>
               <a:ext uri="{FF2B5EF4-FFF2-40B4-BE49-F238E27FC236}">
-                <a16:creationId xmlns:a16="http://schemas.microsoft.com/office/drawing/2014/main" id="{0D8F948C-4C16-4068-32E9-BE7B50FA453E}"/>
+                <a16:creationId xmlns:a16="http://schemas.microsoft.com/office/drawing/2014/main" id="{69EC9791-5CBB-2C5A-5052-FE5E376DA986}"/>
               </a:ext>
             </a:extLst>
           </p:cNvPr>
@@ -8731,7 +9260,7 @@
           <a:p>
             <a:r>
               <a:rPr lang="en-CA" sz="2800" dirty="0"/>
-              <a:t>Proportion of mounts directed at females where females tried to evade</a:t>
+              <a:t>Proportion of mounts directed at other males</a:t>
             </a:r>
           </a:p>
         </p:txBody>
@@ -8741,7 +9270,7 @@
           <p:cNvPr id="5" name="Picture 4">
             <a:extLst>
               <a:ext uri="{FF2B5EF4-FFF2-40B4-BE49-F238E27FC236}">
-                <a16:creationId xmlns:a16="http://schemas.microsoft.com/office/drawing/2014/main" id="{E8633DFC-7A7B-A8E2-9082-A54B40A82820}"/>
+                <a16:creationId xmlns:a16="http://schemas.microsoft.com/office/drawing/2014/main" id="{C4649B12-ACB5-AEB6-28D5-A573725D98C1}"/>
               </a:ext>
             </a:extLst>
           </p:cNvPr>
@@ -8758,8 +9287,8 @@
         </p:blipFill>
         <p:spPr>
           <a:xfrm>
-            <a:off x="3376232" y="936243"/>
-            <a:ext cx="5767768" cy="5798072"/>
+            <a:off x="3104774" y="761487"/>
+            <a:ext cx="5791575" cy="5904531"/>
           </a:xfrm>
           <a:prstGeom prst="rect">
             <a:avLst/>
@@ -8769,7 +9298,7 @@
     </p:spTree>
     <p:extLst>
       <p:ext uri="{BB962C8B-B14F-4D97-AF65-F5344CB8AC3E}">
-        <p14:creationId xmlns:p14="http://schemas.microsoft.com/office/powerpoint/2010/main" val="774785539"/>
+        <p14:creationId xmlns:p14="http://schemas.microsoft.com/office/powerpoint/2010/main" val="897322973"/>
       </p:ext>
     </p:extLst>
   </p:cSld>

</xml_diff>

<commit_message>
Created aggregation networks for replicates 1-4 and 6.
</commit_message>
<xml_diff>
--- a/bb_soc_exp_networks.pptx
+++ b/bb_soc_exp_networks.pptx
@@ -285,7 +285,7 @@
           <a:p>
             <a:fld id="{CB61FE93-40E5-4B90-8B3A-E7F187B3D00B}" type="datetimeFigureOut">
               <a:rPr lang="en-CA" smtClean="0"/>
-              <a:t>2022-11-15</a:t>
+              <a:t>2023-01-29</a:t>
             </a:fld>
             <a:endParaRPr lang="en-CA"/>
           </a:p>
@@ -485,7 +485,7 @@
           <a:p>
             <a:fld id="{CB61FE93-40E5-4B90-8B3A-E7F187B3D00B}" type="datetimeFigureOut">
               <a:rPr lang="en-CA" smtClean="0"/>
-              <a:t>2022-11-15</a:t>
+              <a:t>2023-01-29</a:t>
             </a:fld>
             <a:endParaRPr lang="en-CA"/>
           </a:p>
@@ -695,7 +695,7 @@
           <a:p>
             <a:fld id="{CB61FE93-40E5-4B90-8B3A-E7F187B3D00B}" type="datetimeFigureOut">
               <a:rPr lang="en-CA" smtClean="0"/>
-              <a:t>2022-11-15</a:t>
+              <a:t>2023-01-29</a:t>
             </a:fld>
             <a:endParaRPr lang="en-CA"/>
           </a:p>
@@ -895,7 +895,7 @@
           <a:p>
             <a:fld id="{CB61FE93-40E5-4B90-8B3A-E7F187B3D00B}" type="datetimeFigureOut">
               <a:rPr lang="en-CA" smtClean="0"/>
-              <a:t>2022-11-15</a:t>
+              <a:t>2023-01-29</a:t>
             </a:fld>
             <a:endParaRPr lang="en-CA"/>
           </a:p>
@@ -1171,7 +1171,7 @@
           <a:p>
             <a:fld id="{CB61FE93-40E5-4B90-8B3A-E7F187B3D00B}" type="datetimeFigureOut">
               <a:rPr lang="en-CA" smtClean="0"/>
-              <a:t>2022-11-15</a:t>
+              <a:t>2023-01-29</a:t>
             </a:fld>
             <a:endParaRPr lang="en-CA"/>
           </a:p>
@@ -1439,7 +1439,7 @@
           <a:p>
             <a:fld id="{CB61FE93-40E5-4B90-8B3A-E7F187B3D00B}" type="datetimeFigureOut">
               <a:rPr lang="en-CA" smtClean="0"/>
-              <a:t>2022-11-15</a:t>
+              <a:t>2023-01-29</a:t>
             </a:fld>
             <a:endParaRPr lang="en-CA"/>
           </a:p>
@@ -1854,7 +1854,7 @@
           <a:p>
             <a:fld id="{CB61FE93-40E5-4B90-8B3A-E7F187B3D00B}" type="datetimeFigureOut">
               <a:rPr lang="en-CA" smtClean="0"/>
-              <a:t>2022-11-15</a:t>
+              <a:t>2023-01-29</a:t>
             </a:fld>
             <a:endParaRPr lang="en-CA"/>
           </a:p>
@@ -1996,7 +1996,7 @@
           <a:p>
             <a:fld id="{CB61FE93-40E5-4B90-8B3A-E7F187B3D00B}" type="datetimeFigureOut">
               <a:rPr lang="en-CA" smtClean="0"/>
-              <a:t>2022-11-15</a:t>
+              <a:t>2023-01-29</a:t>
             </a:fld>
             <a:endParaRPr lang="en-CA"/>
           </a:p>
@@ -2109,7 +2109,7 @@
           <a:p>
             <a:fld id="{CB61FE93-40E5-4B90-8B3A-E7F187B3D00B}" type="datetimeFigureOut">
               <a:rPr lang="en-CA" smtClean="0"/>
-              <a:t>2022-11-15</a:t>
+              <a:t>2023-01-29</a:t>
             </a:fld>
             <a:endParaRPr lang="en-CA"/>
           </a:p>
@@ -2422,7 +2422,7 @@
           <a:p>
             <a:fld id="{CB61FE93-40E5-4B90-8B3A-E7F187B3D00B}" type="datetimeFigureOut">
               <a:rPr lang="en-CA" smtClean="0"/>
-              <a:t>2022-11-15</a:t>
+              <a:t>2023-01-29</a:t>
             </a:fld>
             <a:endParaRPr lang="en-CA"/>
           </a:p>
@@ -2711,7 +2711,7 @@
           <a:p>
             <a:fld id="{CB61FE93-40E5-4B90-8B3A-E7F187B3D00B}" type="datetimeFigureOut">
               <a:rPr lang="en-CA" smtClean="0"/>
-              <a:t>2022-11-15</a:t>
+              <a:t>2023-01-29</a:t>
             </a:fld>
             <a:endParaRPr lang="en-CA"/>
           </a:p>
@@ -2954,7 +2954,7 @@
           <a:p>
             <a:fld id="{CB61FE93-40E5-4B90-8B3A-E7F187B3D00B}" type="datetimeFigureOut">
               <a:rPr lang="en-CA" smtClean="0"/>
-              <a:t>2022-11-15</a:t>
+              <a:t>2023-01-29</a:t>
             </a:fld>
             <a:endParaRPr lang="en-CA"/>
           </a:p>

</xml_diff>